<commit_message>
New structure and updates so far
</commit_message>
<xml_diff>
--- a/docs/hierarchy.pptx
+++ b/docs/hierarchy.pptx
@@ -4,9 +4,16 @@
   <p:sldMasterIdLst>
     <p:sldMasterId id="2147483648" r:id="rId1"/>
   </p:sldMasterIdLst>
+  <p:notesMasterIdLst>
+    <p:notesMasterId r:id="rId8"/>
+  </p:notesMasterIdLst>
   <p:sldIdLst>
     <p:sldId id="256" r:id="rId2"/>
     <p:sldId id="257" r:id="rId3"/>
+    <p:sldId id="260" r:id="rId4"/>
+    <p:sldId id="261" r:id="rId5"/>
+    <p:sldId id="263" r:id="rId6"/>
+    <p:sldId id="262" r:id="rId7"/>
   </p:sldIdLst>
   <p:sldSz cx="12192000" cy="6858000"/>
   <p:notesSz cx="6858000" cy="9144000"/>
@@ -113,6 +120,439 @@
 </p:presentation>
 </file>
 
+<file path=ppt/notesMasters/notesMaster1.xml><?xml version="1.0" encoding="utf-8"?>
+<p:notesMaster xmlns:a="http://schemas.openxmlformats.org/drawingml/2006/main" xmlns:r="http://schemas.openxmlformats.org/officeDocument/2006/relationships" xmlns:p="http://schemas.openxmlformats.org/presentationml/2006/main">
+  <p:cSld>
+    <p:bg>
+      <p:bgRef idx="1001">
+        <a:schemeClr val="bg1"/>
+      </p:bgRef>
+    </p:bg>
+    <p:spTree>
+      <p:nvGrpSpPr>
+        <p:cNvPr id="1" name=""/>
+        <p:cNvGrpSpPr/>
+        <p:nvPr/>
+      </p:nvGrpSpPr>
+      <p:grpSpPr>
+        <a:xfrm>
+          <a:off x="0" y="0"/>
+          <a:ext cx="0" cy="0"/>
+          <a:chOff x="0" y="0"/>
+          <a:chExt cx="0" cy="0"/>
+        </a:xfrm>
+      </p:grpSpPr>
+      <p:sp>
+        <p:nvSpPr>
+          <p:cNvPr id="2" name="Header Placeholder 1"/>
+          <p:cNvSpPr>
+            <a:spLocks noGrp="1"/>
+          </p:cNvSpPr>
+          <p:nvPr>
+            <p:ph type="hdr" sz="quarter"/>
+          </p:nvPr>
+        </p:nvSpPr>
+        <p:spPr>
+          <a:xfrm>
+            <a:off x="0" y="0"/>
+            <a:ext cx="2971800" cy="458788"/>
+          </a:xfrm>
+          <a:prstGeom prst="rect">
+            <a:avLst/>
+          </a:prstGeom>
+        </p:spPr>
+        <p:txBody>
+          <a:bodyPr vert="horz" lIns="91440" tIns="45720" rIns="91440" bIns="45720" rtlCol="0"/>
+          <a:lstStyle>
+            <a:lvl1pPr algn="l">
+              <a:defRPr sz="1200"/>
+            </a:lvl1pPr>
+          </a:lstStyle>
+          <a:p>
+            <a:endParaRPr lang="en-US"/>
+          </a:p>
+        </p:txBody>
+      </p:sp>
+      <p:sp>
+        <p:nvSpPr>
+          <p:cNvPr id="3" name="Date Placeholder 2"/>
+          <p:cNvSpPr>
+            <a:spLocks noGrp="1"/>
+          </p:cNvSpPr>
+          <p:nvPr>
+            <p:ph type="dt" idx="1"/>
+          </p:nvPr>
+        </p:nvSpPr>
+        <p:spPr>
+          <a:xfrm>
+            <a:off x="3884613" y="0"/>
+            <a:ext cx="2971800" cy="458788"/>
+          </a:xfrm>
+          <a:prstGeom prst="rect">
+            <a:avLst/>
+          </a:prstGeom>
+        </p:spPr>
+        <p:txBody>
+          <a:bodyPr vert="horz" lIns="91440" tIns="45720" rIns="91440" bIns="45720" rtlCol="0"/>
+          <a:lstStyle>
+            <a:lvl1pPr algn="r">
+              <a:defRPr sz="1200"/>
+            </a:lvl1pPr>
+          </a:lstStyle>
+          <a:p>
+            <a:fld id="{99F120B0-2A2B-4E44-8E83-260D2F9A716A}" type="datetimeFigureOut">
+              <a:rPr lang="en-US" smtClean="0"/>
+              <a:t>7/12/22</a:t>
+            </a:fld>
+            <a:endParaRPr lang="en-US"/>
+          </a:p>
+        </p:txBody>
+      </p:sp>
+      <p:sp>
+        <p:nvSpPr>
+          <p:cNvPr id="4" name="Slide Image Placeholder 3"/>
+          <p:cNvSpPr>
+            <a:spLocks noGrp="1" noRot="1" noChangeAspect="1"/>
+          </p:cNvSpPr>
+          <p:nvPr>
+            <p:ph type="sldImg" idx="2"/>
+          </p:nvPr>
+        </p:nvSpPr>
+        <p:spPr>
+          <a:xfrm>
+            <a:off x="685800" y="1143000"/>
+            <a:ext cx="5486400" cy="3086100"/>
+          </a:xfrm>
+          <a:prstGeom prst="rect">
+            <a:avLst/>
+          </a:prstGeom>
+          <a:noFill/>
+          <a:ln w="12700">
+            <a:solidFill>
+              <a:prstClr val="black"/>
+            </a:solidFill>
+          </a:ln>
+        </p:spPr>
+        <p:txBody>
+          <a:bodyPr vert="horz" lIns="91440" tIns="45720" rIns="91440" bIns="45720" rtlCol="0" anchor="ctr"/>
+          <a:lstStyle/>
+          <a:p>
+            <a:endParaRPr lang="en-US"/>
+          </a:p>
+        </p:txBody>
+      </p:sp>
+      <p:sp>
+        <p:nvSpPr>
+          <p:cNvPr id="5" name="Notes Placeholder 4"/>
+          <p:cNvSpPr>
+            <a:spLocks noGrp="1"/>
+          </p:cNvSpPr>
+          <p:nvPr>
+            <p:ph type="body" sz="quarter" idx="3"/>
+          </p:nvPr>
+        </p:nvSpPr>
+        <p:spPr>
+          <a:xfrm>
+            <a:off x="685800" y="4400550"/>
+            <a:ext cx="5486400" cy="3600450"/>
+          </a:xfrm>
+          <a:prstGeom prst="rect">
+            <a:avLst/>
+          </a:prstGeom>
+        </p:spPr>
+        <p:txBody>
+          <a:bodyPr vert="horz" lIns="91440" tIns="45720" rIns="91440" bIns="45720" rtlCol="0"/>
+          <a:lstStyle/>
+          <a:p>
+            <a:pPr lvl="0"/>
+            <a:r>
+              <a:rPr lang="en-US"/>
+              <a:t>Click to edit Master text styles</a:t>
+            </a:r>
+          </a:p>
+          <a:p>
+            <a:pPr lvl="1"/>
+            <a:r>
+              <a:rPr lang="en-US"/>
+              <a:t>Second level</a:t>
+            </a:r>
+          </a:p>
+          <a:p>
+            <a:pPr lvl="2"/>
+            <a:r>
+              <a:rPr lang="en-US"/>
+              <a:t>Third level</a:t>
+            </a:r>
+          </a:p>
+          <a:p>
+            <a:pPr lvl="3"/>
+            <a:r>
+              <a:rPr lang="en-US"/>
+              <a:t>Fourth level</a:t>
+            </a:r>
+          </a:p>
+          <a:p>
+            <a:pPr lvl="4"/>
+            <a:r>
+              <a:rPr lang="en-US"/>
+              <a:t>Fifth level</a:t>
+            </a:r>
+          </a:p>
+        </p:txBody>
+      </p:sp>
+      <p:sp>
+        <p:nvSpPr>
+          <p:cNvPr id="6" name="Footer Placeholder 5"/>
+          <p:cNvSpPr>
+            <a:spLocks noGrp="1"/>
+          </p:cNvSpPr>
+          <p:nvPr>
+            <p:ph type="ftr" sz="quarter" idx="4"/>
+          </p:nvPr>
+        </p:nvSpPr>
+        <p:spPr>
+          <a:xfrm>
+            <a:off x="0" y="8685213"/>
+            <a:ext cx="2971800" cy="458787"/>
+          </a:xfrm>
+          <a:prstGeom prst="rect">
+            <a:avLst/>
+          </a:prstGeom>
+        </p:spPr>
+        <p:txBody>
+          <a:bodyPr vert="horz" lIns="91440" tIns="45720" rIns="91440" bIns="45720" rtlCol="0" anchor="b"/>
+          <a:lstStyle>
+            <a:lvl1pPr algn="l">
+              <a:defRPr sz="1200"/>
+            </a:lvl1pPr>
+          </a:lstStyle>
+          <a:p>
+            <a:endParaRPr lang="en-US"/>
+          </a:p>
+        </p:txBody>
+      </p:sp>
+      <p:sp>
+        <p:nvSpPr>
+          <p:cNvPr id="7" name="Slide Number Placeholder 6"/>
+          <p:cNvSpPr>
+            <a:spLocks noGrp="1"/>
+          </p:cNvSpPr>
+          <p:nvPr>
+            <p:ph type="sldNum" sz="quarter" idx="5"/>
+          </p:nvPr>
+        </p:nvSpPr>
+        <p:spPr>
+          <a:xfrm>
+            <a:off x="3884613" y="8685213"/>
+            <a:ext cx="2971800" cy="458787"/>
+          </a:xfrm>
+          <a:prstGeom prst="rect">
+            <a:avLst/>
+          </a:prstGeom>
+        </p:spPr>
+        <p:txBody>
+          <a:bodyPr vert="horz" lIns="91440" tIns="45720" rIns="91440" bIns="45720" rtlCol="0" anchor="b"/>
+          <a:lstStyle>
+            <a:lvl1pPr algn="r">
+              <a:defRPr sz="1200"/>
+            </a:lvl1pPr>
+          </a:lstStyle>
+          <a:p>
+            <a:fld id="{0A9A46FC-BBA4-2748-ABCB-32C33B0F3E88}" type="slidenum">
+              <a:rPr lang="en-US" smtClean="0"/>
+              <a:t>‹#›</a:t>
+            </a:fld>
+            <a:endParaRPr lang="en-US"/>
+          </a:p>
+        </p:txBody>
+      </p:sp>
+    </p:spTree>
+    <p:extLst>
+      <p:ext uri="{BB962C8B-B14F-4D97-AF65-F5344CB8AC3E}">
+        <p14:creationId xmlns:p14="http://schemas.microsoft.com/office/powerpoint/2010/main" val="3575659808"/>
+      </p:ext>
+    </p:extLst>
+  </p:cSld>
+  <p:clrMap bg1="lt1" tx1="dk1" bg2="lt2" tx2="dk2" accent1="accent1" accent2="accent2" accent3="accent3" accent4="accent4" accent5="accent5" accent6="accent6" hlink="hlink" folHlink="folHlink"/>
+  <p:notesStyle>
+    <a:lvl1pPr marL="0" algn="l" defTabSz="914400" rtl="0" eaLnBrk="1" latinLnBrk="0" hangingPunct="1">
+      <a:defRPr sz="1200" kern="1200">
+        <a:solidFill>
+          <a:schemeClr val="tx1"/>
+        </a:solidFill>
+        <a:latin typeface="+mn-lt"/>
+        <a:ea typeface="+mn-ea"/>
+        <a:cs typeface="+mn-cs"/>
+      </a:defRPr>
+    </a:lvl1pPr>
+    <a:lvl2pPr marL="457200" algn="l" defTabSz="914400" rtl="0" eaLnBrk="1" latinLnBrk="0" hangingPunct="1">
+      <a:defRPr sz="1200" kern="1200">
+        <a:solidFill>
+          <a:schemeClr val="tx1"/>
+        </a:solidFill>
+        <a:latin typeface="+mn-lt"/>
+        <a:ea typeface="+mn-ea"/>
+        <a:cs typeface="+mn-cs"/>
+      </a:defRPr>
+    </a:lvl2pPr>
+    <a:lvl3pPr marL="914400" algn="l" defTabSz="914400" rtl="0" eaLnBrk="1" latinLnBrk="0" hangingPunct="1">
+      <a:defRPr sz="1200" kern="1200">
+        <a:solidFill>
+          <a:schemeClr val="tx1"/>
+        </a:solidFill>
+        <a:latin typeface="+mn-lt"/>
+        <a:ea typeface="+mn-ea"/>
+        <a:cs typeface="+mn-cs"/>
+      </a:defRPr>
+    </a:lvl3pPr>
+    <a:lvl4pPr marL="1371600" algn="l" defTabSz="914400" rtl="0" eaLnBrk="1" latinLnBrk="0" hangingPunct="1">
+      <a:defRPr sz="1200" kern="1200">
+        <a:solidFill>
+          <a:schemeClr val="tx1"/>
+        </a:solidFill>
+        <a:latin typeface="+mn-lt"/>
+        <a:ea typeface="+mn-ea"/>
+        <a:cs typeface="+mn-cs"/>
+      </a:defRPr>
+    </a:lvl4pPr>
+    <a:lvl5pPr marL="1828800" algn="l" defTabSz="914400" rtl="0" eaLnBrk="1" latinLnBrk="0" hangingPunct="1">
+      <a:defRPr sz="1200" kern="1200">
+        <a:solidFill>
+          <a:schemeClr val="tx1"/>
+        </a:solidFill>
+        <a:latin typeface="+mn-lt"/>
+        <a:ea typeface="+mn-ea"/>
+        <a:cs typeface="+mn-cs"/>
+      </a:defRPr>
+    </a:lvl5pPr>
+    <a:lvl6pPr marL="2286000" algn="l" defTabSz="914400" rtl="0" eaLnBrk="1" latinLnBrk="0" hangingPunct="1">
+      <a:defRPr sz="1200" kern="1200">
+        <a:solidFill>
+          <a:schemeClr val="tx1"/>
+        </a:solidFill>
+        <a:latin typeface="+mn-lt"/>
+        <a:ea typeface="+mn-ea"/>
+        <a:cs typeface="+mn-cs"/>
+      </a:defRPr>
+    </a:lvl6pPr>
+    <a:lvl7pPr marL="2743200" algn="l" defTabSz="914400" rtl="0" eaLnBrk="1" latinLnBrk="0" hangingPunct="1">
+      <a:defRPr sz="1200" kern="1200">
+        <a:solidFill>
+          <a:schemeClr val="tx1"/>
+        </a:solidFill>
+        <a:latin typeface="+mn-lt"/>
+        <a:ea typeface="+mn-ea"/>
+        <a:cs typeface="+mn-cs"/>
+      </a:defRPr>
+    </a:lvl7pPr>
+    <a:lvl8pPr marL="3200400" algn="l" defTabSz="914400" rtl="0" eaLnBrk="1" latinLnBrk="0" hangingPunct="1">
+      <a:defRPr sz="1200" kern="1200">
+        <a:solidFill>
+          <a:schemeClr val="tx1"/>
+        </a:solidFill>
+        <a:latin typeface="+mn-lt"/>
+        <a:ea typeface="+mn-ea"/>
+        <a:cs typeface="+mn-cs"/>
+      </a:defRPr>
+    </a:lvl8pPr>
+    <a:lvl9pPr marL="3657600" algn="l" defTabSz="914400" rtl="0" eaLnBrk="1" latinLnBrk="0" hangingPunct="1">
+      <a:defRPr sz="1200" kern="1200">
+        <a:solidFill>
+          <a:schemeClr val="tx1"/>
+        </a:solidFill>
+        <a:latin typeface="+mn-lt"/>
+        <a:ea typeface="+mn-ea"/>
+        <a:cs typeface="+mn-cs"/>
+      </a:defRPr>
+    </a:lvl9pPr>
+  </p:notesStyle>
+</p:notesMaster>
+</file>
+
+<file path=ppt/notesSlides/notesSlide1.xml><?xml version="1.0" encoding="utf-8"?>
+<p:notes xmlns:a="http://schemas.openxmlformats.org/drawingml/2006/main" xmlns:r="http://schemas.openxmlformats.org/officeDocument/2006/relationships" xmlns:p="http://schemas.openxmlformats.org/presentationml/2006/main">
+  <p:cSld>
+    <p:spTree>
+      <p:nvGrpSpPr>
+        <p:cNvPr id="1" name=""/>
+        <p:cNvGrpSpPr/>
+        <p:nvPr/>
+      </p:nvGrpSpPr>
+      <p:grpSpPr>
+        <a:xfrm>
+          <a:off x="0" y="0"/>
+          <a:ext cx="0" cy="0"/>
+          <a:chOff x="0" y="0"/>
+          <a:chExt cx="0" cy="0"/>
+        </a:xfrm>
+      </p:grpSpPr>
+      <p:sp>
+        <p:nvSpPr>
+          <p:cNvPr id="2" name="Slide Image Placeholder 1"/>
+          <p:cNvSpPr>
+            <a:spLocks noGrp="1" noRot="1" noChangeAspect="1"/>
+          </p:cNvSpPr>
+          <p:nvPr>
+            <p:ph type="sldImg"/>
+          </p:nvPr>
+        </p:nvSpPr>
+        <p:spPr/>
+      </p:sp>
+      <p:sp>
+        <p:nvSpPr>
+          <p:cNvPr id="3" name="Notes Placeholder 2"/>
+          <p:cNvSpPr>
+            <a:spLocks noGrp="1"/>
+          </p:cNvSpPr>
+          <p:nvPr>
+            <p:ph type="body" idx="1"/>
+          </p:nvPr>
+        </p:nvSpPr>
+        <p:spPr/>
+        <p:txBody>
+          <a:bodyPr/>
+          <a:lstStyle/>
+          <a:p>
+            <a:endParaRPr lang="en-US" dirty="0"/>
+          </a:p>
+        </p:txBody>
+      </p:sp>
+      <p:sp>
+        <p:nvSpPr>
+          <p:cNvPr id="4" name="Slide Number Placeholder 3"/>
+          <p:cNvSpPr>
+            <a:spLocks noGrp="1"/>
+          </p:cNvSpPr>
+          <p:nvPr>
+            <p:ph type="sldNum" sz="quarter" idx="5"/>
+          </p:nvPr>
+        </p:nvSpPr>
+        <p:spPr/>
+        <p:txBody>
+          <a:bodyPr/>
+          <a:lstStyle/>
+          <a:p>
+            <a:fld id="{0A9A46FC-BBA4-2748-ABCB-32C33B0F3E88}" type="slidenum">
+              <a:rPr lang="en-US" smtClean="0"/>
+              <a:t>5</a:t>
+            </a:fld>
+            <a:endParaRPr lang="en-US"/>
+          </a:p>
+        </p:txBody>
+      </p:sp>
+    </p:spTree>
+    <p:extLst>
+      <p:ext uri="{BB962C8B-B14F-4D97-AF65-F5344CB8AC3E}">
+        <p14:creationId xmlns:p14="http://schemas.microsoft.com/office/powerpoint/2010/main" val="723483021"/>
+      </p:ext>
+    </p:extLst>
+  </p:cSld>
+  <p:clrMapOvr>
+    <a:masterClrMapping/>
+  </p:clrMapOvr>
+</p:notes>
+</file>
+
 <file path=ppt/slideLayouts/slideLayout1.xml><?xml version="1.0" encoding="utf-8"?>
 <p:sldLayout xmlns:a="http://schemas.openxmlformats.org/drawingml/2006/main" xmlns:r="http://schemas.openxmlformats.org/officeDocument/2006/relationships" xmlns:p="http://schemas.openxmlformats.org/presentationml/2006/main" type="title" preserve="1">
   <p:cSld name="Title Slide">
@@ -260,7 +700,7 @@
           <a:p>
             <a:fld id="{008DDDDF-D9F6-A643-922F-83213EBEBFC1}" type="datetimeFigureOut">
               <a:rPr lang="en-US" smtClean="0"/>
-              <a:t>6/16/22</a:t>
+              <a:t>7/12/22</a:t>
             </a:fld>
             <a:endParaRPr lang="en-US"/>
           </a:p>
@@ -458,7 +898,7 @@
           <a:p>
             <a:fld id="{008DDDDF-D9F6-A643-922F-83213EBEBFC1}" type="datetimeFigureOut">
               <a:rPr lang="en-US" smtClean="0"/>
-              <a:t>6/16/22</a:t>
+              <a:t>7/12/22</a:t>
             </a:fld>
             <a:endParaRPr lang="en-US"/>
           </a:p>
@@ -666,7 +1106,7 @@
           <a:p>
             <a:fld id="{008DDDDF-D9F6-A643-922F-83213EBEBFC1}" type="datetimeFigureOut">
               <a:rPr lang="en-US" smtClean="0"/>
-              <a:t>6/16/22</a:t>
+              <a:t>7/12/22</a:t>
             </a:fld>
             <a:endParaRPr lang="en-US"/>
           </a:p>
@@ -864,7 +1304,7 @@
           <a:p>
             <a:fld id="{008DDDDF-D9F6-A643-922F-83213EBEBFC1}" type="datetimeFigureOut">
               <a:rPr lang="en-US" smtClean="0"/>
-              <a:t>6/16/22</a:t>
+              <a:t>7/12/22</a:t>
             </a:fld>
             <a:endParaRPr lang="en-US"/>
           </a:p>
@@ -1139,7 +1579,7 @@
           <a:p>
             <a:fld id="{008DDDDF-D9F6-A643-922F-83213EBEBFC1}" type="datetimeFigureOut">
               <a:rPr lang="en-US" smtClean="0"/>
-              <a:t>6/16/22</a:t>
+              <a:t>7/12/22</a:t>
             </a:fld>
             <a:endParaRPr lang="en-US"/>
           </a:p>
@@ -1404,7 +1844,7 @@
           <a:p>
             <a:fld id="{008DDDDF-D9F6-A643-922F-83213EBEBFC1}" type="datetimeFigureOut">
               <a:rPr lang="en-US" smtClean="0"/>
-              <a:t>6/16/22</a:t>
+              <a:t>7/12/22</a:t>
             </a:fld>
             <a:endParaRPr lang="en-US"/>
           </a:p>
@@ -1816,7 +2256,7 @@
           <a:p>
             <a:fld id="{008DDDDF-D9F6-A643-922F-83213EBEBFC1}" type="datetimeFigureOut">
               <a:rPr lang="en-US" smtClean="0"/>
-              <a:t>6/16/22</a:t>
+              <a:t>7/12/22</a:t>
             </a:fld>
             <a:endParaRPr lang="en-US"/>
           </a:p>
@@ -1957,7 +2397,7 @@
           <a:p>
             <a:fld id="{008DDDDF-D9F6-A643-922F-83213EBEBFC1}" type="datetimeFigureOut">
               <a:rPr lang="en-US" smtClean="0"/>
-              <a:t>6/16/22</a:t>
+              <a:t>7/12/22</a:t>
             </a:fld>
             <a:endParaRPr lang="en-US"/>
           </a:p>
@@ -2070,7 +2510,7 @@
           <a:p>
             <a:fld id="{008DDDDF-D9F6-A643-922F-83213EBEBFC1}" type="datetimeFigureOut">
               <a:rPr lang="en-US" smtClean="0"/>
-              <a:t>6/16/22</a:t>
+              <a:t>7/12/22</a:t>
             </a:fld>
             <a:endParaRPr lang="en-US"/>
           </a:p>
@@ -2381,7 +2821,7 @@
           <a:p>
             <a:fld id="{008DDDDF-D9F6-A643-922F-83213EBEBFC1}" type="datetimeFigureOut">
               <a:rPr lang="en-US" smtClean="0"/>
-              <a:t>6/16/22</a:t>
+              <a:t>7/12/22</a:t>
             </a:fld>
             <a:endParaRPr lang="en-US"/>
           </a:p>
@@ -2669,7 +3109,7 @@
           <a:p>
             <a:fld id="{008DDDDF-D9F6-A643-922F-83213EBEBFC1}" type="datetimeFigureOut">
               <a:rPr lang="en-US" smtClean="0"/>
-              <a:t>6/16/22</a:t>
+              <a:t>7/12/22</a:t>
             </a:fld>
             <a:endParaRPr lang="en-US"/>
           </a:p>
@@ -2910,7 +3350,7 @@
           <a:p>
             <a:fld id="{008DDDDF-D9F6-A643-922F-83213EBEBFC1}" type="datetimeFigureOut">
               <a:rPr lang="en-US" smtClean="0"/>
-              <a:t>6/16/22</a:t>
+              <a:t>7/12/22</a:t>
             </a:fld>
             <a:endParaRPr lang="en-US"/>
           </a:p>
@@ -4704,7 +5144,7 @@
                   <a:latin typeface="Arial" panose="020B0604020202020204" pitchFamily="34" charset="0"/>
                   <a:cs typeface="Arial" panose="020B0604020202020204" pitchFamily="34" charset="0"/>
                 </a:rPr>
-                <a:t>U1. Long-term vegetation phenology</a:t>
+                <a:t>U1. Long-term vegetation quantity</a:t>
               </a:r>
             </a:p>
             <a:p>
@@ -4738,7 +5178,7 @@
                   <a:latin typeface="Arial" panose="020B0604020202020204" pitchFamily="34" charset="0"/>
                   <a:cs typeface="Arial" panose="020B0604020202020204" pitchFamily="34" charset="0"/>
                 </a:rPr>
-                <a:t>U3. Topography</a:t>
+                <a:t>U3. Broad-scale Landscape</a:t>
               </a:r>
             </a:p>
           </p:txBody>
@@ -5002,6 +5442,2947 @@
     <p:extLst>
       <p:ext uri="{BB962C8B-B14F-4D97-AF65-F5344CB8AC3E}">
         <p14:creationId xmlns:p14="http://schemas.microsoft.com/office/powerpoint/2010/main" val="54201699"/>
+      </p:ext>
+    </p:extLst>
+  </p:cSld>
+  <p:clrMapOvr>
+    <a:masterClrMapping/>
+  </p:clrMapOvr>
+</p:sld>
+</file>
+
+<file path=ppt/slides/slide3.xml><?xml version="1.0" encoding="utf-8"?>
+<p:sld xmlns:a="http://schemas.openxmlformats.org/drawingml/2006/main" xmlns:r="http://schemas.openxmlformats.org/officeDocument/2006/relationships" xmlns:p="http://schemas.openxmlformats.org/presentationml/2006/main">
+  <p:cSld>
+    <p:spTree>
+      <p:nvGrpSpPr>
+        <p:cNvPr id="1" name=""/>
+        <p:cNvGrpSpPr/>
+        <p:nvPr/>
+      </p:nvGrpSpPr>
+      <p:grpSpPr>
+        <a:xfrm>
+          <a:off x="0" y="0"/>
+          <a:ext cx="0" cy="0"/>
+          <a:chOff x="0" y="0"/>
+          <a:chExt cx="0" cy="0"/>
+        </a:xfrm>
+      </p:grpSpPr>
+      <p:sp>
+        <p:nvSpPr>
+          <p:cNvPr id="3" name="Content Placeholder 2">
+            <a:extLst>
+              <a:ext uri="{FF2B5EF4-FFF2-40B4-BE49-F238E27FC236}">
+                <a16:creationId xmlns:a16="http://schemas.microsoft.com/office/drawing/2014/main" id="{66B8D956-60E3-8632-76CA-F8BD14CDB780}"/>
+              </a:ext>
+            </a:extLst>
+          </p:cNvPr>
+          <p:cNvSpPr>
+            <a:spLocks noGrp="1"/>
+          </p:cNvSpPr>
+          <p:nvPr>
+            <p:ph idx="1"/>
+          </p:nvPr>
+        </p:nvSpPr>
+        <p:spPr/>
+        <p:txBody>
+          <a:bodyPr/>
+          <a:lstStyle/>
+          <a:p>
+            <a:r>
+              <a:rPr lang="en-US" dirty="0"/>
+              <a:t>selection of the home range in the landscape</a:t>
+            </a:r>
+          </a:p>
+          <a:p>
+            <a:pPr lvl="1"/>
+            <a:r>
+              <a:rPr lang="en-US" dirty="0"/>
+              <a:t>Climatic similarity</a:t>
+            </a:r>
+          </a:p>
+          <a:p>
+            <a:pPr lvl="1"/>
+            <a:r>
+              <a:rPr lang="en-US" dirty="0"/>
+              <a:t>Probability of home range in the landscape</a:t>
+            </a:r>
+          </a:p>
+          <a:p>
+            <a:r>
+              <a:rPr lang="en-US" dirty="0"/>
+              <a:t>selection of patches in the home range</a:t>
+            </a:r>
+          </a:p>
+          <a:p>
+            <a:pPr lvl="1"/>
+            <a:r>
+              <a:rPr lang="en-US" dirty="0"/>
+              <a:t>Probability of patches in the home range</a:t>
+            </a:r>
+          </a:p>
+        </p:txBody>
+      </p:sp>
+    </p:spTree>
+    <p:extLst>
+      <p:ext uri="{BB962C8B-B14F-4D97-AF65-F5344CB8AC3E}">
+        <p14:creationId xmlns:p14="http://schemas.microsoft.com/office/powerpoint/2010/main" val="428220038"/>
+      </p:ext>
+    </p:extLst>
+  </p:cSld>
+  <p:clrMapOvr>
+    <a:masterClrMapping/>
+  </p:clrMapOvr>
+</p:sld>
+</file>
+
+<file path=ppt/slides/slide4.xml><?xml version="1.0" encoding="utf-8"?>
+<p:sld xmlns:a="http://schemas.openxmlformats.org/drawingml/2006/main" xmlns:r="http://schemas.openxmlformats.org/officeDocument/2006/relationships" xmlns:p="http://schemas.openxmlformats.org/presentationml/2006/main">
+  <p:cSld>
+    <p:spTree>
+      <p:nvGrpSpPr>
+        <p:cNvPr id="1" name=""/>
+        <p:cNvGrpSpPr/>
+        <p:nvPr/>
+      </p:nvGrpSpPr>
+      <p:grpSpPr>
+        <a:xfrm>
+          <a:off x="0" y="0"/>
+          <a:ext cx="0" cy="0"/>
+          <a:chOff x="0" y="0"/>
+          <a:chExt cx="0" cy="0"/>
+        </a:xfrm>
+      </p:grpSpPr>
+      <p:pic>
+        <p:nvPicPr>
+          <p:cNvPr id="4" name="Picture 3" descr="Background pattern&#10;&#10;Description automatically generated">
+            <a:extLst>
+              <a:ext uri="{FF2B5EF4-FFF2-40B4-BE49-F238E27FC236}">
+                <a16:creationId xmlns:a16="http://schemas.microsoft.com/office/drawing/2014/main" id="{591ADA3D-ABB5-46B1-815E-B41719F596A2}"/>
+              </a:ext>
+            </a:extLst>
+          </p:cNvPr>
+          <p:cNvPicPr>
+            <a:picLocks noChangeAspect="1"/>
+          </p:cNvPicPr>
+          <p:nvPr/>
+        </p:nvPicPr>
+        <p:blipFill>
+          <a:blip r:embed="rId2"/>
+          <a:stretch>
+            <a:fillRect/>
+          </a:stretch>
+        </p:blipFill>
+        <p:spPr>
+          <a:xfrm>
+            <a:off x="3170623" y="-236693"/>
+            <a:ext cx="2051877" cy="2031826"/>
+          </a:xfrm>
+          <a:prstGeom prst="rect">
+            <a:avLst/>
+          </a:prstGeom>
+          <a:scene3d>
+            <a:camera prst="orthographicFront"/>
+            <a:lightRig rig="threePt" dir="t"/>
+          </a:scene3d>
+          <a:sp3d extrusionH="76200">
+            <a:extrusionClr>
+              <a:srgbClr val="EA5B6F"/>
+            </a:extrusionClr>
+          </a:sp3d>
+        </p:spPr>
+      </p:pic>
+      <p:pic>
+        <p:nvPicPr>
+          <p:cNvPr id="5" name="Picture 4" descr="Background pattern&#10;&#10;Description automatically generated">
+            <a:extLst>
+              <a:ext uri="{FF2B5EF4-FFF2-40B4-BE49-F238E27FC236}">
+                <a16:creationId xmlns:a16="http://schemas.microsoft.com/office/drawing/2014/main" id="{F507E266-0261-D53F-0E0F-E56406111791}"/>
+              </a:ext>
+            </a:extLst>
+          </p:cNvPr>
+          <p:cNvPicPr>
+            <a:picLocks noChangeAspect="1"/>
+          </p:cNvPicPr>
+          <p:nvPr/>
+        </p:nvPicPr>
+        <p:blipFill>
+          <a:blip r:embed="rId2"/>
+          <a:stretch>
+            <a:fillRect/>
+          </a:stretch>
+        </p:blipFill>
+        <p:spPr>
+          <a:xfrm>
+            <a:off x="3106455" y="-180545"/>
+            <a:ext cx="2051877" cy="2031826"/>
+          </a:xfrm>
+          <a:prstGeom prst="rect">
+            <a:avLst/>
+          </a:prstGeom>
+          <a:scene3d>
+            <a:camera prst="orthographicFront"/>
+            <a:lightRig rig="threePt" dir="t"/>
+          </a:scene3d>
+          <a:sp3d extrusionH="76200">
+            <a:extrusionClr>
+              <a:srgbClr val="EA5B6F"/>
+            </a:extrusionClr>
+          </a:sp3d>
+        </p:spPr>
+      </p:pic>
+      <p:pic>
+        <p:nvPicPr>
+          <p:cNvPr id="6" name="Picture 5" descr="Background pattern&#10;&#10;Description automatically generated">
+            <a:extLst>
+              <a:ext uri="{FF2B5EF4-FFF2-40B4-BE49-F238E27FC236}">
+                <a16:creationId xmlns:a16="http://schemas.microsoft.com/office/drawing/2014/main" id="{EFE8B291-C781-7C3F-3689-F78838F47C88}"/>
+              </a:ext>
+            </a:extLst>
+          </p:cNvPr>
+          <p:cNvPicPr>
+            <a:picLocks noChangeAspect="1"/>
+          </p:cNvPicPr>
+          <p:nvPr/>
+        </p:nvPicPr>
+        <p:blipFill>
+          <a:blip r:embed="rId2"/>
+          <a:stretch>
+            <a:fillRect/>
+          </a:stretch>
+        </p:blipFill>
+        <p:spPr>
+          <a:xfrm>
+            <a:off x="3042287" y="-124397"/>
+            <a:ext cx="2051877" cy="2031826"/>
+          </a:xfrm>
+          <a:prstGeom prst="rect">
+            <a:avLst/>
+          </a:prstGeom>
+          <a:scene3d>
+            <a:camera prst="orthographicFront"/>
+            <a:lightRig rig="threePt" dir="t"/>
+          </a:scene3d>
+          <a:sp3d extrusionH="76200">
+            <a:extrusionClr>
+              <a:srgbClr val="EA5B6F"/>
+            </a:extrusionClr>
+          </a:sp3d>
+        </p:spPr>
+      </p:pic>
+      <p:sp>
+        <p:nvSpPr>
+          <p:cNvPr id="7" name="Rectangle 6">
+            <a:extLst>
+              <a:ext uri="{FF2B5EF4-FFF2-40B4-BE49-F238E27FC236}">
+                <a16:creationId xmlns:a16="http://schemas.microsoft.com/office/drawing/2014/main" id="{10B75EAC-108A-4C61-8661-561176F9C036}"/>
+              </a:ext>
+            </a:extLst>
+          </p:cNvPr>
+          <p:cNvSpPr/>
+          <p:nvPr/>
+        </p:nvSpPr>
+        <p:spPr>
+          <a:xfrm>
+            <a:off x="195571" y="1969222"/>
+            <a:ext cx="1493581" cy="714363"/>
+          </a:xfrm>
+          <a:prstGeom prst="rect">
+            <a:avLst/>
+          </a:prstGeom>
+          <a:noFill/>
+          <a:ln w="28575">
+            <a:solidFill>
+              <a:schemeClr val="tx1"/>
+            </a:solidFill>
+          </a:ln>
+        </p:spPr>
+        <p:style>
+          <a:lnRef idx="2">
+            <a:schemeClr val="accent1">
+              <a:shade val="50000"/>
+            </a:schemeClr>
+          </a:lnRef>
+          <a:fillRef idx="1">
+            <a:schemeClr val="accent1"/>
+          </a:fillRef>
+          <a:effectRef idx="0">
+            <a:schemeClr val="accent1"/>
+          </a:effectRef>
+          <a:fontRef idx="minor">
+            <a:schemeClr val="lt1"/>
+          </a:fontRef>
+        </p:style>
+        <p:txBody>
+          <a:bodyPr rtlCol="0" anchor="ctr"/>
+          <a:lstStyle/>
+          <a:p>
+            <a:pPr algn="ctr"/>
+            <a:r>
+              <a:rPr lang="en-US" sz="2000" b="1" dirty="0">
+                <a:solidFill>
+                  <a:schemeClr val="tx1"/>
+                </a:solidFill>
+              </a:rPr>
+              <a:t>Unit census</a:t>
+            </a:r>
+          </a:p>
+        </p:txBody>
+      </p:sp>
+      <p:sp>
+        <p:nvSpPr>
+          <p:cNvPr id="12" name="TextBox 11">
+            <a:extLst>
+              <a:ext uri="{FF2B5EF4-FFF2-40B4-BE49-F238E27FC236}">
+                <a16:creationId xmlns:a16="http://schemas.microsoft.com/office/drawing/2014/main" id="{C85F6539-50D1-EC25-69A8-8465B60A062A}"/>
+              </a:ext>
+            </a:extLst>
+          </p:cNvPr>
+          <p:cNvSpPr txBox="1"/>
+          <p:nvPr/>
+        </p:nvSpPr>
+        <p:spPr>
+          <a:xfrm>
+            <a:off x="3629476" y="-124397"/>
+            <a:ext cx="1134169" cy="400110"/>
+          </a:xfrm>
+          <a:prstGeom prst="rect">
+            <a:avLst/>
+          </a:prstGeom>
+          <a:noFill/>
+        </p:spPr>
+        <p:txBody>
+          <a:bodyPr wrap="square" rtlCol="0">
+            <a:spAutoFit/>
+          </a:bodyPr>
+          <a:lstStyle/>
+          <a:p>
+            <a:r>
+              <a:rPr lang="en-US" sz="2000" b="1" dirty="0"/>
+              <a:t>Climate</a:t>
+            </a:r>
+          </a:p>
+        </p:txBody>
+      </p:sp>
+      <p:sp>
+        <p:nvSpPr>
+          <p:cNvPr id="13" name="Rectangle 12">
+            <a:extLst>
+              <a:ext uri="{FF2B5EF4-FFF2-40B4-BE49-F238E27FC236}">
+                <a16:creationId xmlns:a16="http://schemas.microsoft.com/office/drawing/2014/main" id="{08CD8A7E-153A-C76C-DEC1-E62C92089B4F}"/>
+              </a:ext>
+            </a:extLst>
+          </p:cNvPr>
+          <p:cNvSpPr/>
+          <p:nvPr/>
+        </p:nvSpPr>
+        <p:spPr>
+          <a:xfrm>
+            <a:off x="10306219" y="5646647"/>
+            <a:ext cx="1493581" cy="714363"/>
+          </a:xfrm>
+          <a:prstGeom prst="rect">
+            <a:avLst/>
+          </a:prstGeom>
+          <a:noFill/>
+          <a:ln w="28575">
+            <a:solidFill>
+              <a:schemeClr val="tx1"/>
+            </a:solidFill>
+          </a:ln>
+        </p:spPr>
+        <p:style>
+          <a:lnRef idx="2">
+            <a:schemeClr val="accent1">
+              <a:shade val="50000"/>
+            </a:schemeClr>
+          </a:lnRef>
+          <a:fillRef idx="1">
+            <a:schemeClr val="accent1"/>
+          </a:fillRef>
+          <a:effectRef idx="0">
+            <a:schemeClr val="accent1"/>
+          </a:effectRef>
+          <a:fontRef idx="minor">
+            <a:schemeClr val="lt1"/>
+          </a:fontRef>
+        </p:style>
+        <p:txBody>
+          <a:bodyPr rtlCol="0" anchor="ctr"/>
+          <a:lstStyle/>
+          <a:p>
+            <a:pPr algn="ctr"/>
+            <a:r>
+              <a:rPr lang="en-US" sz="2000" b="1" dirty="0">
+                <a:solidFill>
+                  <a:schemeClr val="tx1"/>
+                </a:solidFill>
+              </a:rPr>
+              <a:t>Occurrence records</a:t>
+            </a:r>
+          </a:p>
+        </p:txBody>
+      </p:sp>
+      <p:cxnSp>
+        <p:nvCxnSpPr>
+          <p:cNvPr id="18" name="Straight Arrow Connector 17">
+            <a:extLst>
+              <a:ext uri="{FF2B5EF4-FFF2-40B4-BE49-F238E27FC236}">
+                <a16:creationId xmlns:a16="http://schemas.microsoft.com/office/drawing/2014/main" id="{289BA0D4-91CC-3AFE-473B-9BB340C60570}"/>
+              </a:ext>
+            </a:extLst>
+          </p:cNvPr>
+          <p:cNvCxnSpPr>
+            <a:cxnSpLocks/>
+          </p:cNvCxnSpPr>
+          <p:nvPr/>
+        </p:nvCxnSpPr>
+        <p:spPr>
+          <a:xfrm flipV="1">
+            <a:off x="5293894" y="920008"/>
+            <a:ext cx="1556085" cy="6681"/>
+          </a:xfrm>
+          <a:prstGeom prst="straightConnector1">
+            <a:avLst/>
+          </a:prstGeom>
+          <a:ln w="57150">
+            <a:solidFill>
+              <a:schemeClr val="tx1"/>
+            </a:solidFill>
+            <a:tailEnd type="triangle"/>
+          </a:ln>
+        </p:spPr>
+        <p:style>
+          <a:lnRef idx="1">
+            <a:schemeClr val="accent1"/>
+          </a:lnRef>
+          <a:fillRef idx="0">
+            <a:schemeClr val="accent1"/>
+          </a:fillRef>
+          <a:effectRef idx="0">
+            <a:schemeClr val="accent1"/>
+          </a:effectRef>
+          <a:fontRef idx="minor">
+            <a:schemeClr val="tx1"/>
+          </a:fontRef>
+        </p:style>
+      </p:cxnSp>
+      <p:sp>
+        <p:nvSpPr>
+          <p:cNvPr id="20" name="TextBox 19">
+            <a:extLst>
+              <a:ext uri="{FF2B5EF4-FFF2-40B4-BE49-F238E27FC236}">
+                <a16:creationId xmlns:a16="http://schemas.microsoft.com/office/drawing/2014/main" id="{19182B0D-F041-02E2-8441-B74616027F30}"/>
+              </a:ext>
+            </a:extLst>
+          </p:cNvPr>
+          <p:cNvSpPr txBox="1"/>
+          <p:nvPr/>
+        </p:nvSpPr>
+        <p:spPr>
+          <a:xfrm>
+            <a:off x="5293894" y="280358"/>
+            <a:ext cx="1411705" cy="646331"/>
+          </a:xfrm>
+          <a:prstGeom prst="rect">
+            <a:avLst/>
+          </a:prstGeom>
+          <a:noFill/>
+        </p:spPr>
+        <p:txBody>
+          <a:bodyPr wrap="square" rtlCol="0">
+            <a:spAutoFit/>
+          </a:bodyPr>
+          <a:lstStyle/>
+          <a:p>
+            <a:pPr algn="ctr"/>
+            <a:r>
+              <a:rPr lang="en-US" b="1" dirty="0"/>
+              <a:t>Monte Carlo simulation</a:t>
+            </a:r>
+          </a:p>
+        </p:txBody>
+      </p:sp>
+      <p:pic>
+        <p:nvPicPr>
+          <p:cNvPr id="22" name="Picture 21" descr="Background pattern&#10;&#10;Description automatically generated">
+            <a:extLst>
+              <a:ext uri="{FF2B5EF4-FFF2-40B4-BE49-F238E27FC236}">
+                <a16:creationId xmlns:a16="http://schemas.microsoft.com/office/drawing/2014/main" id="{8C539EDA-CCBA-D06A-ABC0-7A94B77DD10B}"/>
+              </a:ext>
+            </a:extLst>
+          </p:cNvPr>
+          <p:cNvPicPr>
+            <a:picLocks noChangeAspect="1"/>
+          </p:cNvPicPr>
+          <p:nvPr/>
+        </p:nvPicPr>
+        <p:blipFill>
+          <a:blip r:embed="rId3">
+            <a:duotone>
+              <a:schemeClr val="accent6">
+                <a:shade val="45000"/>
+                <a:satMod val="135000"/>
+              </a:schemeClr>
+              <a:prstClr val="white"/>
+            </a:duotone>
+            <a:extLst>
+              <a:ext uri="{BEBA8EAE-BF5A-486C-A8C5-ECC9F3942E4B}">
+                <a14:imgProps xmlns:a14="http://schemas.microsoft.com/office/drawing/2010/main">
+                  <a14:imgLayer r:embed="rId4">
+                    <a14:imgEffect>
+                      <a14:artisticChalkSketch/>
+                    </a14:imgEffect>
+                  </a14:imgLayer>
+                </a14:imgProps>
+              </a:ext>
+            </a:extLst>
+          </a:blip>
+          <a:stretch>
+            <a:fillRect/>
+          </a:stretch>
+        </p:blipFill>
+        <p:spPr>
+          <a:xfrm>
+            <a:off x="6922925" y="-180545"/>
+            <a:ext cx="2051877" cy="2031826"/>
+          </a:xfrm>
+          <a:prstGeom prst="rect">
+            <a:avLst/>
+          </a:prstGeom>
+          <a:scene3d>
+            <a:camera prst="orthographicFront"/>
+            <a:lightRig rig="threePt" dir="t"/>
+          </a:scene3d>
+          <a:sp3d extrusionH="76200">
+            <a:extrusionClr>
+              <a:srgbClr val="EA5B6F"/>
+            </a:extrusionClr>
+          </a:sp3d>
+        </p:spPr>
+      </p:pic>
+      <p:sp>
+        <p:nvSpPr>
+          <p:cNvPr id="23" name="TextBox 22">
+            <a:extLst>
+              <a:ext uri="{FF2B5EF4-FFF2-40B4-BE49-F238E27FC236}">
+                <a16:creationId xmlns:a16="http://schemas.microsoft.com/office/drawing/2014/main" id="{CE288F6A-D8F1-5137-25F6-8085A142EF79}"/>
+              </a:ext>
+            </a:extLst>
+          </p:cNvPr>
+          <p:cNvSpPr txBox="1"/>
+          <p:nvPr/>
+        </p:nvSpPr>
+        <p:spPr>
+          <a:xfrm>
+            <a:off x="6922925" y="-124397"/>
+            <a:ext cx="2051877" cy="400110"/>
+          </a:xfrm>
+          <a:prstGeom prst="rect">
+            <a:avLst/>
+          </a:prstGeom>
+          <a:noFill/>
+        </p:spPr>
+        <p:txBody>
+          <a:bodyPr wrap="square" rtlCol="0">
+            <a:spAutoFit/>
+          </a:bodyPr>
+          <a:lstStyle/>
+          <a:p>
+            <a:r>
+              <a:rPr lang="en-US" sz="2000" b="1" dirty="0"/>
+              <a:t>Population range</a:t>
+            </a:r>
+          </a:p>
+        </p:txBody>
+      </p:sp>
+      <p:cxnSp>
+        <p:nvCxnSpPr>
+          <p:cNvPr id="28" name="Elbow Connector 27">
+            <a:extLst>
+              <a:ext uri="{FF2B5EF4-FFF2-40B4-BE49-F238E27FC236}">
+                <a16:creationId xmlns:a16="http://schemas.microsoft.com/office/drawing/2014/main" id="{6627E6A5-11FF-2FED-7B49-9A7A359DFD07}"/>
+              </a:ext>
+            </a:extLst>
+          </p:cNvPr>
+          <p:cNvCxnSpPr>
+            <a:cxnSpLocks/>
+          </p:cNvCxnSpPr>
+          <p:nvPr/>
+        </p:nvCxnSpPr>
+        <p:spPr>
+          <a:xfrm rot="16200000" flipV="1">
+            <a:off x="7809016" y="2270623"/>
+            <a:ext cx="4627113" cy="1860875"/>
+          </a:xfrm>
+          <a:prstGeom prst="bentConnector3">
+            <a:avLst>
+              <a:gd name="adj1" fmla="val 99925"/>
+            </a:avLst>
+          </a:prstGeom>
+          <a:ln w="57150">
+            <a:solidFill>
+              <a:schemeClr val="tx1"/>
+            </a:solidFill>
+            <a:tailEnd type="triangle"/>
+          </a:ln>
+        </p:spPr>
+        <p:style>
+          <a:lnRef idx="1">
+            <a:schemeClr val="accent1"/>
+          </a:lnRef>
+          <a:fillRef idx="0">
+            <a:schemeClr val="accent1"/>
+          </a:fillRef>
+          <a:effectRef idx="0">
+            <a:schemeClr val="accent1"/>
+          </a:effectRef>
+          <a:fontRef idx="minor">
+            <a:schemeClr val="tx1"/>
+          </a:fontRef>
+        </p:style>
+      </p:cxnSp>
+      <p:sp>
+        <p:nvSpPr>
+          <p:cNvPr id="33" name="TextBox 32">
+            <a:extLst>
+              <a:ext uri="{FF2B5EF4-FFF2-40B4-BE49-F238E27FC236}">
+                <a16:creationId xmlns:a16="http://schemas.microsoft.com/office/drawing/2014/main" id="{74A7B0DF-3404-6A79-424C-E26276C20545}"/>
+              </a:ext>
+            </a:extLst>
+          </p:cNvPr>
+          <p:cNvSpPr txBox="1"/>
+          <p:nvPr/>
+        </p:nvSpPr>
+        <p:spPr>
+          <a:xfrm>
+            <a:off x="9415128" y="409888"/>
+            <a:ext cx="1411705" cy="369332"/>
+          </a:xfrm>
+          <a:prstGeom prst="rect">
+            <a:avLst/>
+          </a:prstGeom>
+          <a:noFill/>
+        </p:spPr>
+        <p:txBody>
+          <a:bodyPr wrap="square" rtlCol="0">
+            <a:spAutoFit/>
+          </a:bodyPr>
+          <a:lstStyle/>
+          <a:p>
+            <a:pPr algn="ctr"/>
+            <a:r>
+              <a:rPr lang="en-US" b="1" dirty="0"/>
+              <a:t>Evaluate</a:t>
+            </a:r>
+          </a:p>
+        </p:txBody>
+      </p:sp>
+      <p:pic>
+        <p:nvPicPr>
+          <p:cNvPr id="34" name="Picture 33" descr="Background pattern&#10;&#10;Description automatically generated">
+            <a:extLst>
+              <a:ext uri="{FF2B5EF4-FFF2-40B4-BE49-F238E27FC236}">
+                <a16:creationId xmlns:a16="http://schemas.microsoft.com/office/drawing/2014/main" id="{7B6623DD-6A8A-61D2-7D16-7BE12CF19E9C}"/>
+              </a:ext>
+            </a:extLst>
+          </p:cNvPr>
+          <p:cNvPicPr>
+            <a:picLocks noChangeAspect="1"/>
+          </p:cNvPicPr>
+          <p:nvPr/>
+        </p:nvPicPr>
+        <p:blipFill>
+          <a:blip r:embed="rId2"/>
+          <a:stretch>
+            <a:fillRect/>
+          </a:stretch>
+        </p:blipFill>
+        <p:spPr>
+          <a:xfrm>
+            <a:off x="3170623" y="2413087"/>
+            <a:ext cx="2051877" cy="2031826"/>
+          </a:xfrm>
+          <a:prstGeom prst="rect">
+            <a:avLst/>
+          </a:prstGeom>
+          <a:scene3d>
+            <a:camera prst="orthographicFront"/>
+            <a:lightRig rig="threePt" dir="t"/>
+          </a:scene3d>
+          <a:sp3d extrusionH="76200">
+            <a:extrusionClr>
+              <a:srgbClr val="EA5B6F"/>
+            </a:extrusionClr>
+          </a:sp3d>
+        </p:spPr>
+      </p:pic>
+      <p:pic>
+        <p:nvPicPr>
+          <p:cNvPr id="35" name="Picture 34" descr="Background pattern&#10;&#10;Description automatically generated">
+            <a:extLst>
+              <a:ext uri="{FF2B5EF4-FFF2-40B4-BE49-F238E27FC236}">
+                <a16:creationId xmlns:a16="http://schemas.microsoft.com/office/drawing/2014/main" id="{EAAB215E-1697-9EA2-8B03-70248745CBFE}"/>
+              </a:ext>
+            </a:extLst>
+          </p:cNvPr>
+          <p:cNvPicPr>
+            <a:picLocks noChangeAspect="1"/>
+          </p:cNvPicPr>
+          <p:nvPr/>
+        </p:nvPicPr>
+        <p:blipFill>
+          <a:blip r:embed="rId2"/>
+          <a:stretch>
+            <a:fillRect/>
+          </a:stretch>
+        </p:blipFill>
+        <p:spPr>
+          <a:xfrm>
+            <a:off x="3106455" y="2469235"/>
+            <a:ext cx="2051877" cy="2031826"/>
+          </a:xfrm>
+          <a:prstGeom prst="rect">
+            <a:avLst/>
+          </a:prstGeom>
+          <a:scene3d>
+            <a:camera prst="orthographicFront"/>
+            <a:lightRig rig="threePt" dir="t"/>
+          </a:scene3d>
+          <a:sp3d extrusionH="76200">
+            <a:extrusionClr>
+              <a:srgbClr val="EA5B6F"/>
+            </a:extrusionClr>
+          </a:sp3d>
+        </p:spPr>
+      </p:pic>
+      <p:pic>
+        <p:nvPicPr>
+          <p:cNvPr id="36" name="Picture 35" descr="Background pattern&#10;&#10;Description automatically generated">
+            <a:extLst>
+              <a:ext uri="{FF2B5EF4-FFF2-40B4-BE49-F238E27FC236}">
+                <a16:creationId xmlns:a16="http://schemas.microsoft.com/office/drawing/2014/main" id="{1FE0B2C1-EF5E-531C-7C0C-F6F0E8B4277D}"/>
+              </a:ext>
+            </a:extLst>
+          </p:cNvPr>
+          <p:cNvPicPr>
+            <a:picLocks noChangeAspect="1"/>
+          </p:cNvPicPr>
+          <p:nvPr/>
+        </p:nvPicPr>
+        <p:blipFill>
+          <a:blip r:embed="rId2"/>
+          <a:stretch>
+            <a:fillRect/>
+          </a:stretch>
+        </p:blipFill>
+        <p:spPr>
+          <a:xfrm>
+            <a:off x="3042287" y="2525383"/>
+            <a:ext cx="2051877" cy="2031826"/>
+          </a:xfrm>
+          <a:prstGeom prst="rect">
+            <a:avLst/>
+          </a:prstGeom>
+          <a:scene3d>
+            <a:camera prst="orthographicFront"/>
+            <a:lightRig rig="threePt" dir="t"/>
+          </a:scene3d>
+          <a:sp3d extrusionH="76200">
+            <a:extrusionClr>
+              <a:srgbClr val="EA5B6F"/>
+            </a:extrusionClr>
+          </a:sp3d>
+        </p:spPr>
+      </p:pic>
+      <p:sp>
+        <p:nvSpPr>
+          <p:cNvPr id="37" name="TextBox 36">
+            <a:extLst>
+              <a:ext uri="{FF2B5EF4-FFF2-40B4-BE49-F238E27FC236}">
+                <a16:creationId xmlns:a16="http://schemas.microsoft.com/office/drawing/2014/main" id="{38D052A0-283F-7635-3D74-58AB48272087}"/>
+              </a:ext>
+            </a:extLst>
+          </p:cNvPr>
+          <p:cNvSpPr txBox="1"/>
+          <p:nvPr/>
+        </p:nvSpPr>
+        <p:spPr>
+          <a:xfrm>
+            <a:off x="3170624" y="2525383"/>
+            <a:ext cx="1923540" cy="1323439"/>
+          </a:xfrm>
+          <a:prstGeom prst="rect">
+            <a:avLst/>
+          </a:prstGeom>
+          <a:noFill/>
+        </p:spPr>
+        <p:txBody>
+          <a:bodyPr wrap="square" rtlCol="0">
+            <a:spAutoFit/>
+          </a:bodyPr>
+          <a:lstStyle/>
+          <a:p>
+            <a:pPr algn="ctr"/>
+            <a:r>
+              <a:rPr lang="en-US" sz="2000" b="1" dirty="0"/>
+              <a:t>Large-scale vegetation, landscape &amp; topography</a:t>
+            </a:r>
+          </a:p>
+        </p:txBody>
+      </p:sp>
+      <p:pic>
+        <p:nvPicPr>
+          <p:cNvPr id="40" name="Picture 39" descr="Background pattern&#10;&#10;Description automatically generated">
+            <a:extLst>
+              <a:ext uri="{FF2B5EF4-FFF2-40B4-BE49-F238E27FC236}">
+                <a16:creationId xmlns:a16="http://schemas.microsoft.com/office/drawing/2014/main" id="{3B04A833-4E0F-63DF-F40C-664B56579D10}"/>
+              </a:ext>
+            </a:extLst>
+          </p:cNvPr>
+          <p:cNvPicPr>
+            <a:picLocks noChangeAspect="1"/>
+          </p:cNvPicPr>
+          <p:nvPr/>
+        </p:nvPicPr>
+        <p:blipFill>
+          <a:blip r:embed="rId5">
+            <a:duotone>
+              <a:schemeClr val="accent6">
+                <a:shade val="45000"/>
+                <a:satMod val="135000"/>
+              </a:schemeClr>
+              <a:prstClr val="white"/>
+            </a:duotone>
+            <a:extLst>
+              <a:ext uri="{BEBA8EAE-BF5A-486C-A8C5-ECC9F3942E4B}">
+                <a14:imgProps xmlns:a14="http://schemas.microsoft.com/office/drawing/2010/main">
+                  <a14:imgLayer r:embed="rId6">
+                    <a14:imgEffect>
+                      <a14:artisticPaintStrokes/>
+                    </a14:imgEffect>
+                  </a14:imgLayer>
+                </a14:imgProps>
+              </a:ext>
+            </a:extLst>
+          </a:blip>
+          <a:stretch>
+            <a:fillRect/>
+          </a:stretch>
+        </p:blipFill>
+        <p:spPr>
+          <a:xfrm>
+            <a:off x="6922925" y="2413087"/>
+            <a:ext cx="2051877" cy="2031826"/>
+          </a:xfrm>
+          <a:prstGeom prst="rect">
+            <a:avLst/>
+          </a:prstGeom>
+          <a:scene3d>
+            <a:camera prst="orthographicFront"/>
+            <a:lightRig rig="threePt" dir="t"/>
+          </a:scene3d>
+          <a:sp3d extrusionH="76200">
+            <a:extrusionClr>
+              <a:srgbClr val="EA5B6F"/>
+            </a:extrusionClr>
+          </a:sp3d>
+        </p:spPr>
+      </p:pic>
+      <p:sp>
+        <p:nvSpPr>
+          <p:cNvPr id="41" name="TextBox 40">
+            <a:extLst>
+              <a:ext uri="{FF2B5EF4-FFF2-40B4-BE49-F238E27FC236}">
+                <a16:creationId xmlns:a16="http://schemas.microsoft.com/office/drawing/2014/main" id="{FE0A651D-2044-5F97-B81A-52A8468AECA9}"/>
+              </a:ext>
+            </a:extLst>
+          </p:cNvPr>
+          <p:cNvSpPr txBox="1"/>
+          <p:nvPr/>
+        </p:nvSpPr>
+        <p:spPr>
+          <a:xfrm>
+            <a:off x="7131177" y="2483530"/>
+            <a:ext cx="1635372" cy="400110"/>
+          </a:xfrm>
+          <a:prstGeom prst="rect">
+            <a:avLst/>
+          </a:prstGeom>
+          <a:noFill/>
+        </p:spPr>
+        <p:txBody>
+          <a:bodyPr wrap="square" rtlCol="0">
+            <a:spAutoFit/>
+          </a:bodyPr>
+          <a:lstStyle/>
+          <a:p>
+            <a:pPr algn="ctr"/>
+            <a:r>
+              <a:rPr lang="en-US" sz="2000" b="1" dirty="0"/>
+              <a:t>Home range</a:t>
+            </a:r>
+          </a:p>
+        </p:txBody>
+      </p:sp>
+      <p:cxnSp>
+        <p:nvCxnSpPr>
+          <p:cNvPr id="42" name="Elbow Connector 41">
+            <a:extLst>
+              <a:ext uri="{FF2B5EF4-FFF2-40B4-BE49-F238E27FC236}">
+                <a16:creationId xmlns:a16="http://schemas.microsoft.com/office/drawing/2014/main" id="{BAD5353D-16C1-E86C-DB4B-0BC1BE059DD6}"/>
+              </a:ext>
+            </a:extLst>
+          </p:cNvPr>
+          <p:cNvCxnSpPr>
+            <a:cxnSpLocks/>
+          </p:cNvCxnSpPr>
+          <p:nvPr/>
+        </p:nvCxnSpPr>
+        <p:spPr>
+          <a:xfrm flipV="1">
+            <a:off x="942362" y="887505"/>
+            <a:ext cx="1946763" cy="907628"/>
+          </a:xfrm>
+          <a:prstGeom prst="bentConnector3">
+            <a:avLst>
+              <a:gd name="adj1" fmla="val 1382"/>
+            </a:avLst>
+          </a:prstGeom>
+          <a:ln w="57150">
+            <a:solidFill>
+              <a:schemeClr val="tx1"/>
+            </a:solidFill>
+            <a:tailEnd type="triangle"/>
+          </a:ln>
+        </p:spPr>
+        <p:style>
+          <a:lnRef idx="1">
+            <a:schemeClr val="accent1"/>
+          </a:lnRef>
+          <a:fillRef idx="0">
+            <a:schemeClr val="accent1"/>
+          </a:fillRef>
+          <a:effectRef idx="0">
+            <a:schemeClr val="accent1"/>
+          </a:effectRef>
+          <a:fontRef idx="minor">
+            <a:schemeClr val="tx1"/>
+          </a:fontRef>
+        </p:style>
+      </p:cxnSp>
+      <p:cxnSp>
+        <p:nvCxnSpPr>
+          <p:cNvPr id="49" name="Elbow Connector 48">
+            <a:extLst>
+              <a:ext uri="{FF2B5EF4-FFF2-40B4-BE49-F238E27FC236}">
+                <a16:creationId xmlns:a16="http://schemas.microsoft.com/office/drawing/2014/main" id="{E77F9455-F17E-DD30-279D-0E0E003602C1}"/>
+              </a:ext>
+            </a:extLst>
+          </p:cNvPr>
+          <p:cNvCxnSpPr>
+            <a:cxnSpLocks/>
+          </p:cNvCxnSpPr>
+          <p:nvPr/>
+        </p:nvCxnSpPr>
+        <p:spPr>
+          <a:xfrm>
+            <a:off x="942362" y="2849141"/>
+            <a:ext cx="1940353" cy="809637"/>
+          </a:xfrm>
+          <a:prstGeom prst="bentConnector3">
+            <a:avLst>
+              <a:gd name="adj1" fmla="val 1221"/>
+            </a:avLst>
+          </a:prstGeom>
+          <a:ln w="57150">
+            <a:solidFill>
+              <a:schemeClr val="tx1"/>
+            </a:solidFill>
+            <a:tailEnd type="triangle"/>
+          </a:ln>
+        </p:spPr>
+        <p:style>
+          <a:lnRef idx="1">
+            <a:schemeClr val="accent1"/>
+          </a:lnRef>
+          <a:fillRef idx="0">
+            <a:schemeClr val="accent1"/>
+          </a:fillRef>
+          <a:effectRef idx="0">
+            <a:schemeClr val="accent1"/>
+          </a:effectRef>
+          <a:fontRef idx="minor">
+            <a:schemeClr val="tx1"/>
+          </a:fontRef>
+        </p:style>
+      </p:cxnSp>
+      <p:cxnSp>
+        <p:nvCxnSpPr>
+          <p:cNvPr id="56" name="Straight Arrow Connector 55">
+            <a:extLst>
+              <a:ext uri="{FF2B5EF4-FFF2-40B4-BE49-F238E27FC236}">
+                <a16:creationId xmlns:a16="http://schemas.microsoft.com/office/drawing/2014/main" id="{323625CE-7157-CB55-40DB-D4036B6B8A83}"/>
+              </a:ext>
+            </a:extLst>
+          </p:cNvPr>
+          <p:cNvCxnSpPr>
+            <a:cxnSpLocks/>
+          </p:cNvCxnSpPr>
+          <p:nvPr/>
+        </p:nvCxnSpPr>
+        <p:spPr>
+          <a:xfrm flipV="1">
+            <a:off x="5299100" y="3560564"/>
+            <a:ext cx="1556085" cy="6681"/>
+          </a:xfrm>
+          <a:prstGeom prst="straightConnector1">
+            <a:avLst/>
+          </a:prstGeom>
+          <a:ln w="57150">
+            <a:solidFill>
+              <a:schemeClr val="tx1"/>
+            </a:solidFill>
+            <a:tailEnd type="triangle"/>
+          </a:ln>
+        </p:spPr>
+        <p:style>
+          <a:lnRef idx="1">
+            <a:schemeClr val="accent1"/>
+          </a:lnRef>
+          <a:fillRef idx="0">
+            <a:schemeClr val="accent1"/>
+          </a:fillRef>
+          <a:effectRef idx="0">
+            <a:schemeClr val="accent1"/>
+          </a:effectRef>
+          <a:fontRef idx="minor">
+            <a:schemeClr val="tx1"/>
+          </a:fontRef>
+        </p:style>
+      </p:cxnSp>
+      <p:sp>
+        <p:nvSpPr>
+          <p:cNvPr id="57" name="TextBox 56">
+            <a:extLst>
+              <a:ext uri="{FF2B5EF4-FFF2-40B4-BE49-F238E27FC236}">
+                <a16:creationId xmlns:a16="http://schemas.microsoft.com/office/drawing/2014/main" id="{FED67DCB-CEF5-A340-CF67-EF5677CCE202}"/>
+              </a:ext>
+            </a:extLst>
+          </p:cNvPr>
+          <p:cNvSpPr txBox="1"/>
+          <p:nvPr/>
+        </p:nvSpPr>
+        <p:spPr>
+          <a:xfrm>
+            <a:off x="5299100" y="2920914"/>
+            <a:ext cx="1411705" cy="646331"/>
+          </a:xfrm>
+          <a:prstGeom prst="rect">
+            <a:avLst/>
+          </a:prstGeom>
+          <a:noFill/>
+        </p:spPr>
+        <p:txBody>
+          <a:bodyPr wrap="square" rtlCol="0">
+            <a:spAutoFit/>
+          </a:bodyPr>
+          <a:lstStyle/>
+          <a:p>
+            <a:pPr algn="ctr"/>
+            <a:r>
+              <a:rPr lang="en-US" b="1" dirty="0"/>
+              <a:t>Monte Carlo simulation</a:t>
+            </a:r>
+          </a:p>
+        </p:txBody>
+      </p:sp>
+      <p:cxnSp>
+        <p:nvCxnSpPr>
+          <p:cNvPr id="59" name="Elbow Connector 58">
+            <a:extLst>
+              <a:ext uri="{FF2B5EF4-FFF2-40B4-BE49-F238E27FC236}">
+                <a16:creationId xmlns:a16="http://schemas.microsoft.com/office/drawing/2014/main" id="{6D6FDF44-7B76-F2BC-AB79-25A514382B88}"/>
+              </a:ext>
+            </a:extLst>
+          </p:cNvPr>
+          <p:cNvCxnSpPr>
+            <a:stCxn id="22" idx="2"/>
+            <a:endCxn id="35" idx="0"/>
+          </p:cNvCxnSpPr>
+          <p:nvPr/>
+        </p:nvCxnSpPr>
+        <p:spPr>
+          <a:xfrm rot="5400000">
+            <a:off x="5731652" y="252023"/>
+            <a:ext cx="617954" cy="3816470"/>
+          </a:xfrm>
+          <a:prstGeom prst="bentConnector3">
+            <a:avLst/>
+          </a:prstGeom>
+          <a:ln w="57150">
+            <a:solidFill>
+              <a:schemeClr val="tx1"/>
+            </a:solidFill>
+            <a:tailEnd type="triangle"/>
+          </a:ln>
+        </p:spPr>
+        <p:style>
+          <a:lnRef idx="1">
+            <a:schemeClr val="accent1"/>
+          </a:lnRef>
+          <a:fillRef idx="0">
+            <a:schemeClr val="accent1"/>
+          </a:fillRef>
+          <a:effectRef idx="0">
+            <a:schemeClr val="accent1"/>
+          </a:effectRef>
+          <a:fontRef idx="minor">
+            <a:schemeClr val="tx1"/>
+          </a:fontRef>
+        </p:style>
+      </p:cxnSp>
+      <p:cxnSp>
+        <p:nvCxnSpPr>
+          <p:cNvPr id="62" name="Straight Arrow Connector 61">
+            <a:extLst>
+              <a:ext uri="{FF2B5EF4-FFF2-40B4-BE49-F238E27FC236}">
+                <a16:creationId xmlns:a16="http://schemas.microsoft.com/office/drawing/2014/main" id="{A4E333EC-9603-7709-5174-2C624AD7F498}"/>
+              </a:ext>
+            </a:extLst>
+          </p:cNvPr>
+          <p:cNvCxnSpPr>
+            <a:cxnSpLocks/>
+          </p:cNvCxnSpPr>
+          <p:nvPr/>
+        </p:nvCxnSpPr>
+        <p:spPr>
+          <a:xfrm flipH="1">
+            <a:off x="9186922" y="3435681"/>
+            <a:ext cx="1866088" cy="0"/>
+          </a:xfrm>
+          <a:prstGeom prst="straightConnector1">
+            <a:avLst/>
+          </a:prstGeom>
+          <a:ln w="57150">
+            <a:solidFill>
+              <a:schemeClr val="tx1"/>
+            </a:solidFill>
+            <a:tailEnd type="triangle"/>
+          </a:ln>
+        </p:spPr>
+        <p:style>
+          <a:lnRef idx="1">
+            <a:schemeClr val="accent1"/>
+          </a:lnRef>
+          <a:fillRef idx="0">
+            <a:schemeClr val="accent1"/>
+          </a:fillRef>
+          <a:effectRef idx="0">
+            <a:schemeClr val="accent1"/>
+          </a:effectRef>
+          <a:fontRef idx="minor">
+            <a:schemeClr val="tx1"/>
+          </a:fontRef>
+        </p:style>
+      </p:cxnSp>
+      <p:sp>
+        <p:nvSpPr>
+          <p:cNvPr id="65" name="TextBox 64">
+            <a:extLst>
+              <a:ext uri="{FF2B5EF4-FFF2-40B4-BE49-F238E27FC236}">
+                <a16:creationId xmlns:a16="http://schemas.microsoft.com/office/drawing/2014/main" id="{54A0FB92-A91B-192B-7A1F-B2BF9502D650}"/>
+              </a:ext>
+            </a:extLst>
+          </p:cNvPr>
+          <p:cNvSpPr txBox="1"/>
+          <p:nvPr/>
+        </p:nvSpPr>
+        <p:spPr>
+          <a:xfrm>
+            <a:off x="9415128" y="2957920"/>
+            <a:ext cx="1411705" cy="369332"/>
+          </a:xfrm>
+          <a:prstGeom prst="rect">
+            <a:avLst/>
+          </a:prstGeom>
+          <a:noFill/>
+        </p:spPr>
+        <p:txBody>
+          <a:bodyPr wrap="square" rtlCol="0">
+            <a:spAutoFit/>
+          </a:bodyPr>
+          <a:lstStyle/>
+          <a:p>
+            <a:pPr algn="ctr"/>
+            <a:r>
+              <a:rPr lang="en-US" b="1" dirty="0"/>
+              <a:t>Evaluate</a:t>
+            </a:r>
+          </a:p>
+        </p:txBody>
+      </p:sp>
+      <p:pic>
+        <p:nvPicPr>
+          <p:cNvPr id="66" name="Picture 65" descr="Background pattern&#10;&#10;Description automatically generated">
+            <a:extLst>
+              <a:ext uri="{FF2B5EF4-FFF2-40B4-BE49-F238E27FC236}">
+                <a16:creationId xmlns:a16="http://schemas.microsoft.com/office/drawing/2014/main" id="{BA4D6AEE-4771-13B6-F1D3-94F2EF696A7C}"/>
+              </a:ext>
+            </a:extLst>
+          </p:cNvPr>
+          <p:cNvPicPr>
+            <a:picLocks noChangeAspect="1"/>
+          </p:cNvPicPr>
+          <p:nvPr/>
+        </p:nvPicPr>
+        <p:blipFill>
+          <a:blip r:embed="rId7">
+            <a:duotone>
+              <a:schemeClr val="accent6">
+                <a:shade val="45000"/>
+                <a:satMod val="135000"/>
+              </a:schemeClr>
+              <a:prstClr val="white"/>
+            </a:duotone>
+            <a:extLst>
+              <a:ext uri="{BEBA8EAE-BF5A-486C-A8C5-ECC9F3942E4B}">
+                <a14:imgProps xmlns:a14="http://schemas.microsoft.com/office/drawing/2010/main">
+                  <a14:imgLayer r:embed="rId8">
+                    <a14:imgEffect>
+                      <a14:artisticWatercolorSponge/>
+                    </a14:imgEffect>
+                    <a14:imgEffect>
+                      <a14:brightnessContrast bright="-20000" contrast="40000"/>
+                    </a14:imgEffect>
+                  </a14:imgLayer>
+                </a14:imgProps>
+              </a:ext>
+            </a:extLst>
+          </a:blip>
+          <a:stretch>
+            <a:fillRect/>
+          </a:stretch>
+        </p:blipFill>
+        <p:spPr>
+          <a:xfrm>
+            <a:off x="3042287" y="5044064"/>
+            <a:ext cx="2051877" cy="2031826"/>
+          </a:xfrm>
+          <a:prstGeom prst="rect">
+            <a:avLst/>
+          </a:prstGeom>
+          <a:scene3d>
+            <a:camera prst="orthographicFront"/>
+            <a:lightRig rig="threePt" dir="t"/>
+          </a:scene3d>
+          <a:sp3d extrusionH="76200">
+            <a:extrusionClr>
+              <a:srgbClr val="EA5B6F"/>
+            </a:extrusionClr>
+          </a:sp3d>
+        </p:spPr>
+      </p:pic>
+      <p:sp>
+        <p:nvSpPr>
+          <p:cNvPr id="67" name="TextBox 66">
+            <a:extLst>
+              <a:ext uri="{FF2B5EF4-FFF2-40B4-BE49-F238E27FC236}">
+                <a16:creationId xmlns:a16="http://schemas.microsoft.com/office/drawing/2014/main" id="{B94E1796-8643-5ACF-4B41-4C66867A8BB7}"/>
+              </a:ext>
+            </a:extLst>
+          </p:cNvPr>
+          <p:cNvSpPr txBox="1"/>
+          <p:nvPr/>
+        </p:nvSpPr>
+        <p:spPr>
+          <a:xfrm>
+            <a:off x="3250539" y="5114507"/>
+            <a:ext cx="1635372" cy="400110"/>
+          </a:xfrm>
+          <a:prstGeom prst="rect">
+            <a:avLst/>
+          </a:prstGeom>
+          <a:noFill/>
+        </p:spPr>
+        <p:txBody>
+          <a:bodyPr wrap="square" rtlCol="0">
+            <a:spAutoFit/>
+          </a:bodyPr>
+          <a:lstStyle/>
+          <a:p>
+            <a:pPr algn="ctr"/>
+            <a:r>
+              <a:rPr lang="en-US" sz="2000" b="1" dirty="0"/>
+              <a:t>Local patch</a:t>
+            </a:r>
+          </a:p>
+        </p:txBody>
+      </p:sp>
+      <p:pic>
+        <p:nvPicPr>
+          <p:cNvPr id="68" name="Picture 67" descr="Background pattern&#10;&#10;Description automatically generated">
+            <a:extLst>
+              <a:ext uri="{FF2B5EF4-FFF2-40B4-BE49-F238E27FC236}">
+                <a16:creationId xmlns:a16="http://schemas.microsoft.com/office/drawing/2014/main" id="{1DF033EF-7514-DDEB-AC3A-2CE20939F4DD}"/>
+              </a:ext>
+            </a:extLst>
+          </p:cNvPr>
+          <p:cNvPicPr>
+            <a:picLocks noChangeAspect="1"/>
+          </p:cNvPicPr>
+          <p:nvPr/>
+        </p:nvPicPr>
+        <p:blipFill>
+          <a:blip r:embed="rId2"/>
+          <a:stretch>
+            <a:fillRect/>
+          </a:stretch>
+        </p:blipFill>
+        <p:spPr>
+          <a:xfrm>
+            <a:off x="6978315" y="4931768"/>
+            <a:ext cx="2051877" cy="2031826"/>
+          </a:xfrm>
+          <a:prstGeom prst="rect">
+            <a:avLst/>
+          </a:prstGeom>
+          <a:scene3d>
+            <a:camera prst="orthographicFront"/>
+            <a:lightRig rig="threePt" dir="t"/>
+          </a:scene3d>
+          <a:sp3d extrusionH="76200">
+            <a:extrusionClr>
+              <a:srgbClr val="EA5B6F"/>
+            </a:extrusionClr>
+          </a:sp3d>
+        </p:spPr>
+      </p:pic>
+      <p:pic>
+        <p:nvPicPr>
+          <p:cNvPr id="69" name="Picture 68" descr="Background pattern&#10;&#10;Description automatically generated">
+            <a:extLst>
+              <a:ext uri="{FF2B5EF4-FFF2-40B4-BE49-F238E27FC236}">
+                <a16:creationId xmlns:a16="http://schemas.microsoft.com/office/drawing/2014/main" id="{D23CA59D-AE20-A517-92BA-08F7DE907281}"/>
+              </a:ext>
+            </a:extLst>
+          </p:cNvPr>
+          <p:cNvPicPr>
+            <a:picLocks noChangeAspect="1"/>
+          </p:cNvPicPr>
+          <p:nvPr/>
+        </p:nvPicPr>
+        <p:blipFill>
+          <a:blip r:embed="rId2"/>
+          <a:stretch>
+            <a:fillRect/>
+          </a:stretch>
+        </p:blipFill>
+        <p:spPr>
+          <a:xfrm>
+            <a:off x="6914147" y="4987916"/>
+            <a:ext cx="2051877" cy="2031826"/>
+          </a:xfrm>
+          <a:prstGeom prst="rect">
+            <a:avLst/>
+          </a:prstGeom>
+          <a:scene3d>
+            <a:camera prst="orthographicFront"/>
+            <a:lightRig rig="threePt" dir="t"/>
+          </a:scene3d>
+          <a:sp3d extrusionH="76200">
+            <a:extrusionClr>
+              <a:srgbClr val="EA5B6F"/>
+            </a:extrusionClr>
+          </a:sp3d>
+        </p:spPr>
+      </p:pic>
+      <p:pic>
+        <p:nvPicPr>
+          <p:cNvPr id="70" name="Picture 69" descr="Background pattern&#10;&#10;Description automatically generated">
+            <a:extLst>
+              <a:ext uri="{FF2B5EF4-FFF2-40B4-BE49-F238E27FC236}">
+                <a16:creationId xmlns:a16="http://schemas.microsoft.com/office/drawing/2014/main" id="{4DD99A0A-E2AB-DE74-3363-E0508BCD81AE}"/>
+              </a:ext>
+            </a:extLst>
+          </p:cNvPr>
+          <p:cNvPicPr>
+            <a:picLocks noChangeAspect="1"/>
+          </p:cNvPicPr>
+          <p:nvPr/>
+        </p:nvPicPr>
+        <p:blipFill>
+          <a:blip r:embed="rId2"/>
+          <a:stretch>
+            <a:fillRect/>
+          </a:stretch>
+        </p:blipFill>
+        <p:spPr>
+          <a:xfrm>
+            <a:off x="6849979" y="5044064"/>
+            <a:ext cx="2051877" cy="2031826"/>
+          </a:xfrm>
+          <a:prstGeom prst="rect">
+            <a:avLst/>
+          </a:prstGeom>
+          <a:scene3d>
+            <a:camera prst="orthographicFront"/>
+            <a:lightRig rig="threePt" dir="t"/>
+          </a:scene3d>
+          <a:sp3d extrusionH="76200">
+            <a:extrusionClr>
+              <a:srgbClr val="EA5B6F"/>
+            </a:extrusionClr>
+          </a:sp3d>
+        </p:spPr>
+      </p:pic>
+      <p:sp>
+        <p:nvSpPr>
+          <p:cNvPr id="71" name="TextBox 70">
+            <a:extLst>
+              <a:ext uri="{FF2B5EF4-FFF2-40B4-BE49-F238E27FC236}">
+                <a16:creationId xmlns:a16="http://schemas.microsoft.com/office/drawing/2014/main" id="{DB7A5DAF-EA68-3FC1-A4C9-C3E7D7E5A31F}"/>
+              </a:ext>
+            </a:extLst>
+          </p:cNvPr>
+          <p:cNvSpPr txBox="1"/>
+          <p:nvPr/>
+        </p:nvSpPr>
+        <p:spPr>
+          <a:xfrm>
+            <a:off x="6978316" y="5044064"/>
+            <a:ext cx="1923540" cy="1323439"/>
+          </a:xfrm>
+          <a:prstGeom prst="rect">
+            <a:avLst/>
+          </a:prstGeom>
+          <a:noFill/>
+        </p:spPr>
+        <p:txBody>
+          <a:bodyPr wrap="square" rtlCol="0">
+            <a:spAutoFit/>
+          </a:bodyPr>
+          <a:lstStyle/>
+          <a:p>
+            <a:pPr algn="ctr"/>
+            <a:r>
+              <a:rPr lang="en-US" sz="2000" b="1" dirty="0"/>
+              <a:t>Fine-scale vegetation, landscape &amp; anthropology</a:t>
+            </a:r>
+          </a:p>
+        </p:txBody>
+      </p:sp>
+      <p:cxnSp>
+        <p:nvCxnSpPr>
+          <p:cNvPr id="74" name="Straight Arrow Connector 73">
+            <a:extLst>
+              <a:ext uri="{FF2B5EF4-FFF2-40B4-BE49-F238E27FC236}">
+                <a16:creationId xmlns:a16="http://schemas.microsoft.com/office/drawing/2014/main" id="{BF41D348-7BE0-C7C3-E600-EC621DA14552}"/>
+              </a:ext>
+            </a:extLst>
+          </p:cNvPr>
+          <p:cNvCxnSpPr>
+            <a:cxnSpLocks/>
+          </p:cNvCxnSpPr>
+          <p:nvPr/>
+        </p:nvCxnSpPr>
+        <p:spPr>
+          <a:xfrm flipH="1">
+            <a:off x="9128172" y="6034646"/>
+            <a:ext cx="991794" cy="0"/>
+          </a:xfrm>
+          <a:prstGeom prst="straightConnector1">
+            <a:avLst/>
+          </a:prstGeom>
+          <a:ln w="57150">
+            <a:solidFill>
+              <a:schemeClr val="tx1"/>
+            </a:solidFill>
+            <a:tailEnd type="triangle"/>
+          </a:ln>
+        </p:spPr>
+        <p:style>
+          <a:lnRef idx="1">
+            <a:schemeClr val="accent1"/>
+          </a:lnRef>
+          <a:fillRef idx="0">
+            <a:schemeClr val="accent1"/>
+          </a:fillRef>
+          <a:effectRef idx="0">
+            <a:schemeClr val="accent1"/>
+          </a:effectRef>
+          <a:fontRef idx="minor">
+            <a:schemeClr val="tx1"/>
+          </a:fontRef>
+        </p:style>
+      </p:cxnSp>
+      <p:cxnSp>
+        <p:nvCxnSpPr>
+          <p:cNvPr id="77" name="Straight Arrow Connector 76">
+            <a:extLst>
+              <a:ext uri="{FF2B5EF4-FFF2-40B4-BE49-F238E27FC236}">
+                <a16:creationId xmlns:a16="http://schemas.microsoft.com/office/drawing/2014/main" id="{B5B49D46-25C7-05D7-28AB-7B6EA5B8E94E}"/>
+              </a:ext>
+            </a:extLst>
+          </p:cNvPr>
+          <p:cNvCxnSpPr>
+            <a:cxnSpLocks/>
+          </p:cNvCxnSpPr>
+          <p:nvPr/>
+        </p:nvCxnSpPr>
+        <p:spPr>
+          <a:xfrm flipH="1">
+            <a:off x="5168375" y="6059977"/>
+            <a:ext cx="1537224" cy="0"/>
+          </a:xfrm>
+          <a:prstGeom prst="straightConnector1">
+            <a:avLst/>
+          </a:prstGeom>
+          <a:ln w="57150">
+            <a:solidFill>
+              <a:schemeClr val="tx1"/>
+            </a:solidFill>
+            <a:tailEnd type="triangle"/>
+          </a:ln>
+        </p:spPr>
+        <p:style>
+          <a:lnRef idx="1">
+            <a:schemeClr val="accent1"/>
+          </a:lnRef>
+          <a:fillRef idx="0">
+            <a:schemeClr val="accent1"/>
+          </a:fillRef>
+          <a:effectRef idx="0">
+            <a:schemeClr val="accent1"/>
+          </a:effectRef>
+          <a:fontRef idx="minor">
+            <a:schemeClr val="tx1"/>
+          </a:fontRef>
+        </p:style>
+      </p:cxnSp>
+      <p:sp>
+        <p:nvSpPr>
+          <p:cNvPr id="79" name="TextBox 78">
+            <a:extLst>
+              <a:ext uri="{FF2B5EF4-FFF2-40B4-BE49-F238E27FC236}">
+                <a16:creationId xmlns:a16="http://schemas.microsoft.com/office/drawing/2014/main" id="{5E1F7A77-0761-BE82-8B4E-01150E919A70}"/>
+              </a:ext>
+            </a:extLst>
+          </p:cNvPr>
+          <p:cNvSpPr txBox="1"/>
+          <p:nvPr/>
+        </p:nvSpPr>
+        <p:spPr>
+          <a:xfrm>
+            <a:off x="1213526" y="721948"/>
+            <a:ext cx="1064454" cy="369331"/>
+          </a:xfrm>
+          <a:prstGeom prst="rect">
+            <a:avLst/>
+          </a:prstGeom>
+          <a:solidFill>
+            <a:schemeClr val="bg1"/>
+          </a:solidFill>
+        </p:spPr>
+        <p:txBody>
+          <a:bodyPr wrap="square" rtlCol="0" anchor="ctr">
+            <a:spAutoFit/>
+          </a:bodyPr>
+          <a:lstStyle/>
+          <a:p>
+            <a:pPr algn="ctr"/>
+            <a:r>
+              <a:rPr lang="en-US" b="1" dirty="0"/>
+              <a:t>STEP 1          </a:t>
+            </a:r>
+          </a:p>
+        </p:txBody>
+      </p:sp>
+      <p:sp>
+        <p:nvSpPr>
+          <p:cNvPr id="80" name="TextBox 79">
+            <a:extLst>
+              <a:ext uri="{FF2B5EF4-FFF2-40B4-BE49-F238E27FC236}">
+                <a16:creationId xmlns:a16="http://schemas.microsoft.com/office/drawing/2014/main" id="{2CEC8FD2-7D9B-1777-C36E-289E66E04010}"/>
+              </a:ext>
+            </a:extLst>
+          </p:cNvPr>
+          <p:cNvSpPr txBox="1"/>
+          <p:nvPr/>
+        </p:nvSpPr>
+        <p:spPr>
+          <a:xfrm>
+            <a:off x="1213526" y="3429000"/>
+            <a:ext cx="1064454" cy="369331"/>
+          </a:xfrm>
+          <a:prstGeom prst="rect">
+            <a:avLst/>
+          </a:prstGeom>
+          <a:solidFill>
+            <a:schemeClr val="bg1"/>
+          </a:solidFill>
+        </p:spPr>
+        <p:txBody>
+          <a:bodyPr wrap="square" rtlCol="0" anchor="ctr">
+            <a:spAutoFit/>
+          </a:bodyPr>
+          <a:lstStyle/>
+          <a:p>
+            <a:pPr algn="ctr"/>
+            <a:r>
+              <a:rPr lang="en-US" b="1" dirty="0"/>
+              <a:t>STEP 2          </a:t>
+            </a:r>
+          </a:p>
+        </p:txBody>
+      </p:sp>
+      <p:sp>
+        <p:nvSpPr>
+          <p:cNvPr id="81" name="TextBox 80">
+            <a:extLst>
+              <a:ext uri="{FF2B5EF4-FFF2-40B4-BE49-F238E27FC236}">
+                <a16:creationId xmlns:a16="http://schemas.microsoft.com/office/drawing/2014/main" id="{081316BB-5328-1445-3BE7-6EF8C1F3546C}"/>
+              </a:ext>
+            </a:extLst>
+          </p:cNvPr>
+          <p:cNvSpPr txBox="1"/>
+          <p:nvPr/>
+        </p:nvSpPr>
+        <p:spPr>
+          <a:xfrm>
+            <a:off x="9269948" y="5552668"/>
+            <a:ext cx="850018" cy="369332"/>
+          </a:xfrm>
+          <a:prstGeom prst="rect">
+            <a:avLst/>
+          </a:prstGeom>
+          <a:solidFill>
+            <a:schemeClr val="bg1"/>
+          </a:solidFill>
+        </p:spPr>
+        <p:txBody>
+          <a:bodyPr wrap="square" rtlCol="0" anchor="ctr">
+            <a:spAutoFit/>
+          </a:bodyPr>
+          <a:lstStyle/>
+          <a:p>
+            <a:pPr algn="ctr"/>
+            <a:r>
+              <a:rPr lang="en-US" b="1" dirty="0"/>
+              <a:t>STEP 3          </a:t>
+            </a:r>
+          </a:p>
+        </p:txBody>
+      </p:sp>
+      <p:cxnSp>
+        <p:nvCxnSpPr>
+          <p:cNvPr id="82" name="Elbow Connector 81">
+            <a:extLst>
+              <a:ext uri="{FF2B5EF4-FFF2-40B4-BE49-F238E27FC236}">
+                <a16:creationId xmlns:a16="http://schemas.microsoft.com/office/drawing/2014/main" id="{E6B12153-B75C-26E6-5A38-FE3D1B60830A}"/>
+              </a:ext>
+            </a:extLst>
+          </p:cNvPr>
+          <p:cNvCxnSpPr>
+            <a:cxnSpLocks/>
+          </p:cNvCxnSpPr>
+          <p:nvPr/>
+        </p:nvCxnSpPr>
+        <p:spPr>
+          <a:xfrm rot="5400000">
+            <a:off x="7780882" y="4716414"/>
+            <a:ext cx="318411" cy="1"/>
+          </a:xfrm>
+          <a:prstGeom prst="bentConnector3">
+            <a:avLst/>
+          </a:prstGeom>
+          <a:ln w="57150">
+            <a:solidFill>
+              <a:schemeClr val="tx1"/>
+            </a:solidFill>
+            <a:tailEnd type="triangle"/>
+          </a:ln>
+        </p:spPr>
+        <p:style>
+          <a:lnRef idx="1">
+            <a:schemeClr val="accent1"/>
+          </a:lnRef>
+          <a:fillRef idx="0">
+            <a:schemeClr val="accent1"/>
+          </a:fillRef>
+          <a:effectRef idx="0">
+            <a:schemeClr val="accent1"/>
+          </a:effectRef>
+          <a:fontRef idx="minor">
+            <a:schemeClr val="tx1"/>
+          </a:fontRef>
+        </p:style>
+      </p:cxnSp>
+      <p:sp>
+        <p:nvSpPr>
+          <p:cNvPr id="85" name="TextBox 84">
+            <a:extLst>
+              <a:ext uri="{FF2B5EF4-FFF2-40B4-BE49-F238E27FC236}">
+                <a16:creationId xmlns:a16="http://schemas.microsoft.com/office/drawing/2014/main" id="{EFE29793-CB23-F02B-F2F7-FD81E6ED62CD}"/>
+              </a:ext>
+            </a:extLst>
+          </p:cNvPr>
+          <p:cNvSpPr txBox="1"/>
+          <p:nvPr/>
+        </p:nvSpPr>
+        <p:spPr>
+          <a:xfrm>
+            <a:off x="391832" y="5262609"/>
+            <a:ext cx="2220693" cy="707886"/>
+          </a:xfrm>
+          <a:prstGeom prst="rect">
+            <a:avLst/>
+          </a:prstGeom>
+          <a:noFill/>
+        </p:spPr>
+        <p:txBody>
+          <a:bodyPr wrap="square" rtlCol="0">
+            <a:spAutoFit/>
+          </a:bodyPr>
+          <a:lstStyle/>
+          <a:p>
+            <a:pPr algn="ctr"/>
+            <a:r>
+              <a:rPr lang="en-US" sz="2000" b="1" dirty="0">
+                <a:solidFill>
+                  <a:srgbClr val="FF0000"/>
+                </a:solidFill>
+              </a:rPr>
+              <a:t>Nested multi-level structure</a:t>
+            </a:r>
+          </a:p>
+        </p:txBody>
+      </p:sp>
+    </p:spTree>
+    <p:extLst>
+      <p:ext uri="{BB962C8B-B14F-4D97-AF65-F5344CB8AC3E}">
+        <p14:creationId xmlns:p14="http://schemas.microsoft.com/office/powerpoint/2010/main" val="3336395011"/>
+      </p:ext>
+    </p:extLst>
+  </p:cSld>
+  <p:clrMapOvr>
+    <a:masterClrMapping/>
+  </p:clrMapOvr>
+</p:sld>
+</file>
+
+<file path=ppt/slides/slide5.xml><?xml version="1.0" encoding="utf-8"?>
+<p:sld xmlns:a="http://schemas.openxmlformats.org/drawingml/2006/main" xmlns:r="http://schemas.openxmlformats.org/officeDocument/2006/relationships" xmlns:p="http://schemas.openxmlformats.org/presentationml/2006/main">
+  <p:cSld>
+    <p:spTree>
+      <p:nvGrpSpPr>
+        <p:cNvPr id="1" name=""/>
+        <p:cNvGrpSpPr/>
+        <p:nvPr/>
+      </p:nvGrpSpPr>
+      <p:grpSpPr>
+        <a:xfrm>
+          <a:off x="0" y="0"/>
+          <a:ext cx="0" cy="0"/>
+          <a:chOff x="0" y="0"/>
+          <a:chExt cx="0" cy="0"/>
+        </a:xfrm>
+      </p:grpSpPr>
+      <p:sp>
+        <p:nvSpPr>
+          <p:cNvPr id="7" name="Rectangle 6">
+            <a:extLst>
+              <a:ext uri="{FF2B5EF4-FFF2-40B4-BE49-F238E27FC236}">
+                <a16:creationId xmlns:a16="http://schemas.microsoft.com/office/drawing/2014/main" id="{10B75EAC-108A-4C61-8661-561176F9C036}"/>
+              </a:ext>
+            </a:extLst>
+          </p:cNvPr>
+          <p:cNvSpPr/>
+          <p:nvPr/>
+        </p:nvSpPr>
+        <p:spPr>
+          <a:xfrm>
+            <a:off x="583680" y="1228274"/>
+            <a:ext cx="1493581" cy="714363"/>
+          </a:xfrm>
+          <a:prstGeom prst="rect">
+            <a:avLst/>
+          </a:prstGeom>
+          <a:noFill/>
+          <a:ln w="28575">
+            <a:solidFill>
+              <a:schemeClr val="tx1"/>
+            </a:solidFill>
+          </a:ln>
+        </p:spPr>
+        <p:style>
+          <a:lnRef idx="2">
+            <a:schemeClr val="accent1">
+              <a:shade val="50000"/>
+            </a:schemeClr>
+          </a:lnRef>
+          <a:fillRef idx="1">
+            <a:schemeClr val="accent1"/>
+          </a:fillRef>
+          <a:effectRef idx="0">
+            <a:schemeClr val="accent1"/>
+          </a:effectRef>
+          <a:fontRef idx="minor">
+            <a:schemeClr val="lt1"/>
+          </a:fontRef>
+        </p:style>
+        <p:txBody>
+          <a:bodyPr rtlCol="0" anchor="ctr"/>
+          <a:lstStyle/>
+          <a:p>
+            <a:pPr algn="ctr"/>
+            <a:r>
+              <a:rPr lang="en-US" sz="2000" b="1" dirty="0">
+                <a:solidFill>
+                  <a:schemeClr val="tx1"/>
+                </a:solidFill>
+              </a:rPr>
+              <a:t>Unit census</a:t>
+            </a:r>
+          </a:p>
+        </p:txBody>
+      </p:sp>
+      <p:sp>
+        <p:nvSpPr>
+          <p:cNvPr id="13" name="Rectangle 12">
+            <a:extLst>
+              <a:ext uri="{FF2B5EF4-FFF2-40B4-BE49-F238E27FC236}">
+                <a16:creationId xmlns:a16="http://schemas.microsoft.com/office/drawing/2014/main" id="{08CD8A7E-153A-C76C-DEC1-E62C92089B4F}"/>
+              </a:ext>
+            </a:extLst>
+          </p:cNvPr>
+          <p:cNvSpPr/>
+          <p:nvPr/>
+        </p:nvSpPr>
+        <p:spPr>
+          <a:xfrm>
+            <a:off x="10151612" y="4516374"/>
+            <a:ext cx="1493581" cy="714363"/>
+          </a:xfrm>
+          <a:prstGeom prst="rect">
+            <a:avLst/>
+          </a:prstGeom>
+          <a:noFill/>
+          <a:ln w="28575">
+            <a:solidFill>
+              <a:schemeClr val="tx1"/>
+            </a:solidFill>
+          </a:ln>
+        </p:spPr>
+        <p:style>
+          <a:lnRef idx="2">
+            <a:schemeClr val="accent1">
+              <a:shade val="50000"/>
+            </a:schemeClr>
+          </a:lnRef>
+          <a:fillRef idx="1">
+            <a:schemeClr val="accent1"/>
+          </a:fillRef>
+          <a:effectRef idx="0">
+            <a:schemeClr val="accent1"/>
+          </a:effectRef>
+          <a:fontRef idx="minor">
+            <a:schemeClr val="lt1"/>
+          </a:fontRef>
+        </p:style>
+        <p:txBody>
+          <a:bodyPr rtlCol="0" anchor="ctr"/>
+          <a:lstStyle/>
+          <a:p>
+            <a:pPr algn="ctr"/>
+            <a:r>
+              <a:rPr lang="en-US" sz="2000" b="1" dirty="0">
+                <a:solidFill>
+                  <a:schemeClr val="tx1"/>
+                </a:solidFill>
+              </a:rPr>
+              <a:t>Occurrence records</a:t>
+            </a:r>
+          </a:p>
+        </p:txBody>
+      </p:sp>
+      <p:cxnSp>
+        <p:nvCxnSpPr>
+          <p:cNvPr id="28" name="Elbow Connector 27">
+            <a:extLst>
+              <a:ext uri="{FF2B5EF4-FFF2-40B4-BE49-F238E27FC236}">
+                <a16:creationId xmlns:a16="http://schemas.microsoft.com/office/drawing/2014/main" id="{6627E6A5-11FF-2FED-7B49-9A7A359DFD07}"/>
+              </a:ext>
+            </a:extLst>
+          </p:cNvPr>
+          <p:cNvCxnSpPr>
+            <a:cxnSpLocks/>
+          </p:cNvCxnSpPr>
+          <p:nvPr/>
+        </p:nvCxnSpPr>
+        <p:spPr>
+          <a:xfrm rot="16200000" flipV="1">
+            <a:off x="8665975" y="2151914"/>
+            <a:ext cx="2985332" cy="1479525"/>
+          </a:xfrm>
+          <a:prstGeom prst="bentConnector3">
+            <a:avLst>
+              <a:gd name="adj1" fmla="val 100189"/>
+            </a:avLst>
+          </a:prstGeom>
+          <a:ln w="57150">
+            <a:solidFill>
+              <a:schemeClr val="tx1"/>
+            </a:solidFill>
+            <a:tailEnd type="triangle"/>
+          </a:ln>
+        </p:spPr>
+        <p:style>
+          <a:lnRef idx="1">
+            <a:schemeClr val="accent1"/>
+          </a:lnRef>
+          <a:fillRef idx="0">
+            <a:schemeClr val="accent1"/>
+          </a:fillRef>
+          <a:effectRef idx="0">
+            <a:schemeClr val="accent1"/>
+          </a:effectRef>
+          <a:fontRef idx="minor">
+            <a:schemeClr val="tx1"/>
+          </a:fontRef>
+        </p:style>
+      </p:cxnSp>
+      <p:sp>
+        <p:nvSpPr>
+          <p:cNvPr id="33" name="TextBox 32">
+            <a:extLst>
+              <a:ext uri="{FF2B5EF4-FFF2-40B4-BE49-F238E27FC236}">
+                <a16:creationId xmlns:a16="http://schemas.microsoft.com/office/drawing/2014/main" id="{74A7B0DF-3404-6A79-424C-E26276C20545}"/>
+              </a:ext>
+            </a:extLst>
+          </p:cNvPr>
+          <p:cNvSpPr txBox="1"/>
+          <p:nvPr/>
+        </p:nvSpPr>
+        <p:spPr>
+          <a:xfrm>
+            <a:off x="9531131" y="973531"/>
+            <a:ext cx="1411705" cy="369332"/>
+          </a:xfrm>
+          <a:prstGeom prst="rect">
+            <a:avLst/>
+          </a:prstGeom>
+          <a:noFill/>
+        </p:spPr>
+        <p:txBody>
+          <a:bodyPr wrap="square" rtlCol="0">
+            <a:spAutoFit/>
+          </a:bodyPr>
+          <a:lstStyle/>
+          <a:p>
+            <a:pPr algn="ctr"/>
+            <a:r>
+              <a:rPr lang="en-US" b="1" dirty="0"/>
+              <a:t>Evaluate</a:t>
+            </a:r>
+          </a:p>
+        </p:txBody>
+      </p:sp>
+      <p:pic>
+        <p:nvPicPr>
+          <p:cNvPr id="34" name="Picture 33" descr="Background pattern&#10;&#10;Description automatically generated">
+            <a:extLst>
+              <a:ext uri="{FF2B5EF4-FFF2-40B4-BE49-F238E27FC236}">
+                <a16:creationId xmlns:a16="http://schemas.microsoft.com/office/drawing/2014/main" id="{7B6623DD-6A8A-61D2-7D16-7BE12CF19E9C}"/>
+              </a:ext>
+            </a:extLst>
+          </p:cNvPr>
+          <p:cNvPicPr>
+            <a:picLocks noChangeAspect="1"/>
+          </p:cNvPicPr>
+          <p:nvPr/>
+        </p:nvPicPr>
+        <p:blipFill>
+          <a:blip r:embed="rId3"/>
+          <a:stretch>
+            <a:fillRect/>
+          </a:stretch>
+        </p:blipFill>
+        <p:spPr>
+          <a:xfrm>
+            <a:off x="3406149" y="459906"/>
+            <a:ext cx="2051877" cy="2031826"/>
+          </a:xfrm>
+          <a:prstGeom prst="rect">
+            <a:avLst/>
+          </a:prstGeom>
+          <a:scene3d>
+            <a:camera prst="orthographicFront"/>
+            <a:lightRig rig="threePt" dir="t"/>
+          </a:scene3d>
+          <a:sp3d extrusionH="76200">
+            <a:extrusionClr>
+              <a:srgbClr val="EA5B6F"/>
+            </a:extrusionClr>
+          </a:sp3d>
+        </p:spPr>
+      </p:pic>
+      <p:pic>
+        <p:nvPicPr>
+          <p:cNvPr id="35" name="Picture 34" descr="Background pattern&#10;&#10;Description automatically generated">
+            <a:extLst>
+              <a:ext uri="{FF2B5EF4-FFF2-40B4-BE49-F238E27FC236}">
+                <a16:creationId xmlns:a16="http://schemas.microsoft.com/office/drawing/2014/main" id="{EAAB215E-1697-9EA2-8B03-70248745CBFE}"/>
+              </a:ext>
+            </a:extLst>
+          </p:cNvPr>
+          <p:cNvPicPr>
+            <a:picLocks noChangeAspect="1"/>
+          </p:cNvPicPr>
+          <p:nvPr/>
+        </p:nvPicPr>
+        <p:blipFill>
+          <a:blip r:embed="rId3"/>
+          <a:stretch>
+            <a:fillRect/>
+          </a:stretch>
+        </p:blipFill>
+        <p:spPr>
+          <a:xfrm>
+            <a:off x="3341981" y="516054"/>
+            <a:ext cx="2051877" cy="2031826"/>
+          </a:xfrm>
+          <a:prstGeom prst="rect">
+            <a:avLst/>
+          </a:prstGeom>
+          <a:scene3d>
+            <a:camera prst="orthographicFront"/>
+            <a:lightRig rig="threePt" dir="t"/>
+          </a:scene3d>
+          <a:sp3d extrusionH="76200">
+            <a:extrusionClr>
+              <a:srgbClr val="EA5B6F"/>
+            </a:extrusionClr>
+          </a:sp3d>
+        </p:spPr>
+      </p:pic>
+      <p:pic>
+        <p:nvPicPr>
+          <p:cNvPr id="36" name="Picture 35" descr="Background pattern&#10;&#10;Description automatically generated">
+            <a:extLst>
+              <a:ext uri="{FF2B5EF4-FFF2-40B4-BE49-F238E27FC236}">
+                <a16:creationId xmlns:a16="http://schemas.microsoft.com/office/drawing/2014/main" id="{1FE0B2C1-EF5E-531C-7C0C-F6F0E8B4277D}"/>
+              </a:ext>
+            </a:extLst>
+          </p:cNvPr>
+          <p:cNvPicPr>
+            <a:picLocks noChangeAspect="1"/>
+          </p:cNvPicPr>
+          <p:nvPr/>
+        </p:nvPicPr>
+        <p:blipFill>
+          <a:blip r:embed="rId3"/>
+          <a:stretch>
+            <a:fillRect/>
+          </a:stretch>
+        </p:blipFill>
+        <p:spPr>
+          <a:xfrm>
+            <a:off x="3277813" y="572202"/>
+            <a:ext cx="2051877" cy="2031826"/>
+          </a:xfrm>
+          <a:prstGeom prst="rect">
+            <a:avLst/>
+          </a:prstGeom>
+          <a:scene3d>
+            <a:camera prst="orthographicFront"/>
+            <a:lightRig rig="threePt" dir="t"/>
+          </a:scene3d>
+          <a:sp3d extrusionH="76200">
+            <a:extrusionClr>
+              <a:srgbClr val="EA5B6F"/>
+            </a:extrusionClr>
+          </a:sp3d>
+        </p:spPr>
+      </p:pic>
+      <p:sp>
+        <p:nvSpPr>
+          <p:cNvPr id="37" name="TextBox 36">
+            <a:extLst>
+              <a:ext uri="{FF2B5EF4-FFF2-40B4-BE49-F238E27FC236}">
+                <a16:creationId xmlns:a16="http://schemas.microsoft.com/office/drawing/2014/main" id="{38D052A0-283F-7635-3D74-58AB48272087}"/>
+              </a:ext>
+            </a:extLst>
+          </p:cNvPr>
+          <p:cNvSpPr txBox="1"/>
+          <p:nvPr/>
+        </p:nvSpPr>
+        <p:spPr>
+          <a:xfrm>
+            <a:off x="3406150" y="572202"/>
+            <a:ext cx="1923540" cy="1938992"/>
+          </a:xfrm>
+          <a:prstGeom prst="rect">
+            <a:avLst/>
+          </a:prstGeom>
+          <a:noFill/>
+        </p:spPr>
+        <p:txBody>
+          <a:bodyPr wrap="square" rtlCol="0">
+            <a:spAutoFit/>
+          </a:bodyPr>
+          <a:lstStyle/>
+          <a:p>
+            <a:pPr algn="ctr"/>
+            <a:r>
+              <a:rPr lang="en-US" sz="2000" b="1" dirty="0"/>
+              <a:t>Large-scale climate, vegetation, landscape, anthropology &amp; topography</a:t>
+            </a:r>
+          </a:p>
+        </p:txBody>
+      </p:sp>
+      <p:pic>
+        <p:nvPicPr>
+          <p:cNvPr id="40" name="Picture 39" descr="Background pattern&#10;&#10;Description automatically generated">
+            <a:extLst>
+              <a:ext uri="{FF2B5EF4-FFF2-40B4-BE49-F238E27FC236}">
+                <a16:creationId xmlns:a16="http://schemas.microsoft.com/office/drawing/2014/main" id="{3B04A833-4E0F-63DF-F40C-664B56579D10}"/>
+              </a:ext>
+            </a:extLst>
+          </p:cNvPr>
+          <p:cNvPicPr>
+            <a:picLocks noChangeAspect="1"/>
+          </p:cNvPicPr>
+          <p:nvPr/>
+        </p:nvPicPr>
+        <p:blipFill>
+          <a:blip r:embed="rId4">
+            <a:duotone>
+              <a:schemeClr val="accent6">
+                <a:shade val="45000"/>
+                <a:satMod val="135000"/>
+              </a:schemeClr>
+              <a:prstClr val="white"/>
+            </a:duotone>
+            <a:extLst>
+              <a:ext uri="{BEBA8EAE-BF5A-486C-A8C5-ECC9F3942E4B}">
+                <a14:imgProps xmlns:a14="http://schemas.microsoft.com/office/drawing/2010/main">
+                  <a14:imgLayer r:embed="rId5">
+                    <a14:imgEffect>
+                      <a14:artisticPaintStrokes/>
+                    </a14:imgEffect>
+                  </a14:imgLayer>
+                </a14:imgProps>
+              </a:ext>
+            </a:extLst>
+          </a:blip>
+          <a:stretch>
+            <a:fillRect/>
+          </a:stretch>
+        </p:blipFill>
+        <p:spPr>
+          <a:xfrm>
+            <a:off x="7158451" y="459906"/>
+            <a:ext cx="2051877" cy="2031826"/>
+          </a:xfrm>
+          <a:prstGeom prst="rect">
+            <a:avLst/>
+          </a:prstGeom>
+          <a:scene3d>
+            <a:camera prst="orthographicFront"/>
+            <a:lightRig rig="threePt" dir="t"/>
+          </a:scene3d>
+          <a:sp3d extrusionH="76200">
+            <a:extrusionClr>
+              <a:srgbClr val="EA5B6F"/>
+            </a:extrusionClr>
+          </a:sp3d>
+        </p:spPr>
+      </p:pic>
+      <p:sp>
+        <p:nvSpPr>
+          <p:cNvPr id="41" name="TextBox 40">
+            <a:extLst>
+              <a:ext uri="{FF2B5EF4-FFF2-40B4-BE49-F238E27FC236}">
+                <a16:creationId xmlns:a16="http://schemas.microsoft.com/office/drawing/2014/main" id="{FE0A651D-2044-5F97-B81A-52A8468AECA9}"/>
+              </a:ext>
+            </a:extLst>
+          </p:cNvPr>
+          <p:cNvSpPr txBox="1"/>
+          <p:nvPr/>
+        </p:nvSpPr>
+        <p:spPr>
+          <a:xfrm>
+            <a:off x="7366703" y="530349"/>
+            <a:ext cx="1635372" cy="400110"/>
+          </a:xfrm>
+          <a:prstGeom prst="rect">
+            <a:avLst/>
+          </a:prstGeom>
+          <a:noFill/>
+        </p:spPr>
+        <p:txBody>
+          <a:bodyPr wrap="square" rtlCol="0">
+            <a:spAutoFit/>
+          </a:bodyPr>
+          <a:lstStyle/>
+          <a:p>
+            <a:pPr algn="ctr"/>
+            <a:r>
+              <a:rPr lang="en-US" sz="2000" b="1" dirty="0"/>
+              <a:t>Home range</a:t>
+            </a:r>
+          </a:p>
+        </p:txBody>
+      </p:sp>
+      <p:cxnSp>
+        <p:nvCxnSpPr>
+          <p:cNvPr id="56" name="Straight Arrow Connector 55">
+            <a:extLst>
+              <a:ext uri="{FF2B5EF4-FFF2-40B4-BE49-F238E27FC236}">
+                <a16:creationId xmlns:a16="http://schemas.microsoft.com/office/drawing/2014/main" id="{323625CE-7157-CB55-40DB-D4036B6B8A83}"/>
+              </a:ext>
+            </a:extLst>
+          </p:cNvPr>
+          <p:cNvCxnSpPr>
+            <a:cxnSpLocks/>
+          </p:cNvCxnSpPr>
+          <p:nvPr/>
+        </p:nvCxnSpPr>
+        <p:spPr>
+          <a:xfrm flipV="1">
+            <a:off x="5534626" y="1607383"/>
+            <a:ext cx="1556085" cy="6681"/>
+          </a:xfrm>
+          <a:prstGeom prst="straightConnector1">
+            <a:avLst/>
+          </a:prstGeom>
+          <a:ln w="57150">
+            <a:solidFill>
+              <a:schemeClr val="tx1"/>
+            </a:solidFill>
+            <a:tailEnd type="triangle"/>
+          </a:ln>
+        </p:spPr>
+        <p:style>
+          <a:lnRef idx="1">
+            <a:schemeClr val="accent1"/>
+          </a:lnRef>
+          <a:fillRef idx="0">
+            <a:schemeClr val="accent1"/>
+          </a:fillRef>
+          <a:effectRef idx="0">
+            <a:schemeClr val="accent1"/>
+          </a:effectRef>
+          <a:fontRef idx="minor">
+            <a:schemeClr val="tx1"/>
+          </a:fontRef>
+        </p:style>
+      </p:cxnSp>
+      <p:sp>
+        <p:nvSpPr>
+          <p:cNvPr id="57" name="TextBox 56">
+            <a:extLst>
+              <a:ext uri="{FF2B5EF4-FFF2-40B4-BE49-F238E27FC236}">
+                <a16:creationId xmlns:a16="http://schemas.microsoft.com/office/drawing/2014/main" id="{FED67DCB-CEF5-A340-CF67-EF5677CCE202}"/>
+              </a:ext>
+            </a:extLst>
+          </p:cNvPr>
+          <p:cNvSpPr txBox="1"/>
+          <p:nvPr/>
+        </p:nvSpPr>
+        <p:spPr>
+          <a:xfrm>
+            <a:off x="5534626" y="967733"/>
+            <a:ext cx="1411705" cy="646331"/>
+          </a:xfrm>
+          <a:prstGeom prst="rect">
+            <a:avLst/>
+          </a:prstGeom>
+          <a:noFill/>
+        </p:spPr>
+        <p:txBody>
+          <a:bodyPr wrap="square" rtlCol="0">
+            <a:spAutoFit/>
+          </a:bodyPr>
+          <a:lstStyle/>
+          <a:p>
+            <a:pPr algn="ctr"/>
+            <a:r>
+              <a:rPr lang="en-US" b="1" dirty="0"/>
+              <a:t>Monte Carlo simulation</a:t>
+            </a:r>
+          </a:p>
+        </p:txBody>
+      </p:sp>
+      <p:pic>
+        <p:nvPicPr>
+          <p:cNvPr id="66" name="Picture 65" descr="Background pattern&#10;&#10;Description automatically generated">
+            <a:extLst>
+              <a:ext uri="{FF2B5EF4-FFF2-40B4-BE49-F238E27FC236}">
+                <a16:creationId xmlns:a16="http://schemas.microsoft.com/office/drawing/2014/main" id="{BA4D6AEE-4771-13B6-F1D3-94F2EF696A7C}"/>
+              </a:ext>
+            </a:extLst>
+          </p:cNvPr>
+          <p:cNvPicPr>
+            <a:picLocks noChangeAspect="1"/>
+          </p:cNvPicPr>
+          <p:nvPr/>
+        </p:nvPicPr>
+        <p:blipFill>
+          <a:blip r:embed="rId6">
+            <a:duotone>
+              <a:schemeClr val="accent6">
+                <a:shade val="45000"/>
+                <a:satMod val="135000"/>
+              </a:schemeClr>
+              <a:prstClr val="white"/>
+            </a:duotone>
+            <a:extLst>
+              <a:ext uri="{BEBA8EAE-BF5A-486C-A8C5-ECC9F3942E4B}">
+                <a14:imgProps xmlns:a14="http://schemas.microsoft.com/office/drawing/2010/main">
+                  <a14:imgLayer r:embed="rId7">
+                    <a14:imgEffect>
+                      <a14:artisticWatercolorSponge/>
+                    </a14:imgEffect>
+                    <a14:imgEffect>
+                      <a14:brightnessContrast bright="-20000" contrast="40000"/>
+                    </a14:imgEffect>
+                  </a14:imgLayer>
+                </a14:imgProps>
+              </a:ext>
+            </a:extLst>
+          </a:blip>
+          <a:stretch>
+            <a:fillRect/>
+          </a:stretch>
+        </p:blipFill>
+        <p:spPr>
+          <a:xfrm>
+            <a:off x="3283019" y="3913791"/>
+            <a:ext cx="2051877" cy="2031826"/>
+          </a:xfrm>
+          <a:prstGeom prst="rect">
+            <a:avLst/>
+          </a:prstGeom>
+          <a:scene3d>
+            <a:camera prst="orthographicFront"/>
+            <a:lightRig rig="threePt" dir="t"/>
+          </a:scene3d>
+          <a:sp3d extrusionH="76200">
+            <a:extrusionClr>
+              <a:srgbClr val="EA5B6F"/>
+            </a:extrusionClr>
+          </a:sp3d>
+        </p:spPr>
+      </p:pic>
+      <p:sp>
+        <p:nvSpPr>
+          <p:cNvPr id="67" name="TextBox 66">
+            <a:extLst>
+              <a:ext uri="{FF2B5EF4-FFF2-40B4-BE49-F238E27FC236}">
+                <a16:creationId xmlns:a16="http://schemas.microsoft.com/office/drawing/2014/main" id="{B94E1796-8643-5ACF-4B41-4C66867A8BB7}"/>
+              </a:ext>
+            </a:extLst>
+          </p:cNvPr>
+          <p:cNvSpPr txBox="1"/>
+          <p:nvPr/>
+        </p:nvSpPr>
+        <p:spPr>
+          <a:xfrm>
+            <a:off x="3491271" y="3984234"/>
+            <a:ext cx="1635372" cy="400110"/>
+          </a:xfrm>
+          <a:prstGeom prst="rect">
+            <a:avLst/>
+          </a:prstGeom>
+          <a:noFill/>
+        </p:spPr>
+        <p:txBody>
+          <a:bodyPr wrap="square" rtlCol="0">
+            <a:spAutoFit/>
+          </a:bodyPr>
+          <a:lstStyle/>
+          <a:p>
+            <a:pPr algn="ctr"/>
+            <a:r>
+              <a:rPr lang="en-US" sz="2000" b="1" dirty="0"/>
+              <a:t>Local patch</a:t>
+            </a:r>
+          </a:p>
+        </p:txBody>
+      </p:sp>
+      <p:pic>
+        <p:nvPicPr>
+          <p:cNvPr id="68" name="Picture 67" descr="Background pattern&#10;&#10;Description automatically generated">
+            <a:extLst>
+              <a:ext uri="{FF2B5EF4-FFF2-40B4-BE49-F238E27FC236}">
+                <a16:creationId xmlns:a16="http://schemas.microsoft.com/office/drawing/2014/main" id="{1DF033EF-7514-DDEB-AC3A-2CE20939F4DD}"/>
+              </a:ext>
+            </a:extLst>
+          </p:cNvPr>
+          <p:cNvPicPr>
+            <a:picLocks noChangeAspect="1"/>
+          </p:cNvPicPr>
+          <p:nvPr/>
+        </p:nvPicPr>
+        <p:blipFill>
+          <a:blip r:embed="rId3"/>
+          <a:stretch>
+            <a:fillRect/>
+          </a:stretch>
+        </p:blipFill>
+        <p:spPr>
+          <a:xfrm>
+            <a:off x="7219047" y="3801495"/>
+            <a:ext cx="2051877" cy="2031826"/>
+          </a:xfrm>
+          <a:prstGeom prst="rect">
+            <a:avLst/>
+          </a:prstGeom>
+          <a:scene3d>
+            <a:camera prst="orthographicFront"/>
+            <a:lightRig rig="threePt" dir="t"/>
+          </a:scene3d>
+          <a:sp3d extrusionH="76200">
+            <a:extrusionClr>
+              <a:srgbClr val="EA5B6F"/>
+            </a:extrusionClr>
+          </a:sp3d>
+        </p:spPr>
+      </p:pic>
+      <p:pic>
+        <p:nvPicPr>
+          <p:cNvPr id="69" name="Picture 68" descr="Background pattern&#10;&#10;Description automatically generated">
+            <a:extLst>
+              <a:ext uri="{FF2B5EF4-FFF2-40B4-BE49-F238E27FC236}">
+                <a16:creationId xmlns:a16="http://schemas.microsoft.com/office/drawing/2014/main" id="{D23CA59D-AE20-A517-92BA-08F7DE907281}"/>
+              </a:ext>
+            </a:extLst>
+          </p:cNvPr>
+          <p:cNvPicPr>
+            <a:picLocks noChangeAspect="1"/>
+          </p:cNvPicPr>
+          <p:nvPr/>
+        </p:nvPicPr>
+        <p:blipFill>
+          <a:blip r:embed="rId3"/>
+          <a:stretch>
+            <a:fillRect/>
+          </a:stretch>
+        </p:blipFill>
+        <p:spPr>
+          <a:xfrm>
+            <a:off x="7154879" y="3857643"/>
+            <a:ext cx="2051877" cy="2031826"/>
+          </a:xfrm>
+          <a:prstGeom prst="rect">
+            <a:avLst/>
+          </a:prstGeom>
+          <a:scene3d>
+            <a:camera prst="orthographicFront"/>
+            <a:lightRig rig="threePt" dir="t"/>
+          </a:scene3d>
+          <a:sp3d extrusionH="76200">
+            <a:extrusionClr>
+              <a:srgbClr val="EA5B6F"/>
+            </a:extrusionClr>
+          </a:sp3d>
+        </p:spPr>
+      </p:pic>
+      <p:pic>
+        <p:nvPicPr>
+          <p:cNvPr id="70" name="Picture 69" descr="Background pattern&#10;&#10;Description automatically generated">
+            <a:extLst>
+              <a:ext uri="{FF2B5EF4-FFF2-40B4-BE49-F238E27FC236}">
+                <a16:creationId xmlns:a16="http://schemas.microsoft.com/office/drawing/2014/main" id="{4DD99A0A-E2AB-DE74-3363-E0508BCD81AE}"/>
+              </a:ext>
+            </a:extLst>
+          </p:cNvPr>
+          <p:cNvPicPr>
+            <a:picLocks noChangeAspect="1"/>
+          </p:cNvPicPr>
+          <p:nvPr/>
+        </p:nvPicPr>
+        <p:blipFill>
+          <a:blip r:embed="rId3"/>
+          <a:stretch>
+            <a:fillRect/>
+          </a:stretch>
+        </p:blipFill>
+        <p:spPr>
+          <a:xfrm>
+            <a:off x="7090711" y="3913791"/>
+            <a:ext cx="2051877" cy="2031826"/>
+          </a:xfrm>
+          <a:prstGeom prst="rect">
+            <a:avLst/>
+          </a:prstGeom>
+          <a:scene3d>
+            <a:camera prst="orthographicFront"/>
+            <a:lightRig rig="threePt" dir="t"/>
+          </a:scene3d>
+          <a:sp3d extrusionH="76200">
+            <a:extrusionClr>
+              <a:srgbClr val="EA5B6F"/>
+            </a:extrusionClr>
+          </a:sp3d>
+        </p:spPr>
+      </p:pic>
+      <p:sp>
+        <p:nvSpPr>
+          <p:cNvPr id="71" name="TextBox 70">
+            <a:extLst>
+              <a:ext uri="{FF2B5EF4-FFF2-40B4-BE49-F238E27FC236}">
+                <a16:creationId xmlns:a16="http://schemas.microsoft.com/office/drawing/2014/main" id="{DB7A5DAF-EA68-3FC1-A4C9-C3E7D7E5A31F}"/>
+              </a:ext>
+            </a:extLst>
+          </p:cNvPr>
+          <p:cNvSpPr txBox="1"/>
+          <p:nvPr/>
+        </p:nvSpPr>
+        <p:spPr>
+          <a:xfrm>
+            <a:off x="7219047" y="3913791"/>
+            <a:ext cx="1846027" cy="1631216"/>
+          </a:xfrm>
+          <a:prstGeom prst="rect">
+            <a:avLst/>
+          </a:prstGeom>
+          <a:noFill/>
+        </p:spPr>
+        <p:txBody>
+          <a:bodyPr wrap="square" rtlCol="0">
+            <a:spAutoFit/>
+          </a:bodyPr>
+          <a:lstStyle/>
+          <a:p>
+            <a:pPr algn="ctr"/>
+            <a:r>
+              <a:rPr lang="en-US" sz="2000" b="1" dirty="0"/>
+              <a:t>Fine-scale vegetation, landscape, anthropology &amp; topography</a:t>
+            </a:r>
+          </a:p>
+        </p:txBody>
+      </p:sp>
+      <p:cxnSp>
+        <p:nvCxnSpPr>
+          <p:cNvPr id="74" name="Straight Arrow Connector 73">
+            <a:extLst>
+              <a:ext uri="{FF2B5EF4-FFF2-40B4-BE49-F238E27FC236}">
+                <a16:creationId xmlns:a16="http://schemas.microsoft.com/office/drawing/2014/main" id="{BF41D348-7BE0-C7C3-E600-EC621DA14552}"/>
+              </a:ext>
+            </a:extLst>
+          </p:cNvPr>
+          <p:cNvCxnSpPr>
+            <a:cxnSpLocks/>
+          </p:cNvCxnSpPr>
+          <p:nvPr/>
+        </p:nvCxnSpPr>
+        <p:spPr>
+          <a:xfrm flipH="1">
+            <a:off x="9370543" y="4938123"/>
+            <a:ext cx="638978" cy="0"/>
+          </a:xfrm>
+          <a:prstGeom prst="straightConnector1">
+            <a:avLst/>
+          </a:prstGeom>
+          <a:ln w="57150">
+            <a:solidFill>
+              <a:schemeClr val="tx1"/>
+            </a:solidFill>
+            <a:tailEnd type="triangle"/>
+          </a:ln>
+        </p:spPr>
+        <p:style>
+          <a:lnRef idx="1">
+            <a:schemeClr val="accent1"/>
+          </a:lnRef>
+          <a:fillRef idx="0">
+            <a:schemeClr val="accent1"/>
+          </a:fillRef>
+          <a:effectRef idx="0">
+            <a:schemeClr val="accent1"/>
+          </a:effectRef>
+          <a:fontRef idx="minor">
+            <a:schemeClr val="tx1"/>
+          </a:fontRef>
+        </p:style>
+      </p:cxnSp>
+      <p:cxnSp>
+        <p:nvCxnSpPr>
+          <p:cNvPr id="77" name="Straight Arrow Connector 76">
+            <a:extLst>
+              <a:ext uri="{FF2B5EF4-FFF2-40B4-BE49-F238E27FC236}">
+                <a16:creationId xmlns:a16="http://schemas.microsoft.com/office/drawing/2014/main" id="{B5B49D46-25C7-05D7-28AB-7B6EA5B8E94E}"/>
+              </a:ext>
+            </a:extLst>
+          </p:cNvPr>
+          <p:cNvCxnSpPr>
+            <a:cxnSpLocks/>
+          </p:cNvCxnSpPr>
+          <p:nvPr/>
+        </p:nvCxnSpPr>
+        <p:spPr>
+          <a:xfrm flipH="1">
+            <a:off x="5409107" y="4929704"/>
+            <a:ext cx="1537224" cy="0"/>
+          </a:xfrm>
+          <a:prstGeom prst="straightConnector1">
+            <a:avLst/>
+          </a:prstGeom>
+          <a:ln w="57150">
+            <a:solidFill>
+              <a:schemeClr val="tx1"/>
+            </a:solidFill>
+            <a:tailEnd type="triangle"/>
+          </a:ln>
+        </p:spPr>
+        <p:style>
+          <a:lnRef idx="1">
+            <a:schemeClr val="accent1"/>
+          </a:lnRef>
+          <a:fillRef idx="0">
+            <a:schemeClr val="accent1"/>
+          </a:fillRef>
+          <a:effectRef idx="0">
+            <a:schemeClr val="accent1"/>
+          </a:effectRef>
+          <a:fontRef idx="minor">
+            <a:schemeClr val="tx1"/>
+          </a:fontRef>
+        </p:style>
+      </p:cxnSp>
+      <p:cxnSp>
+        <p:nvCxnSpPr>
+          <p:cNvPr id="82" name="Elbow Connector 81">
+            <a:extLst>
+              <a:ext uri="{FF2B5EF4-FFF2-40B4-BE49-F238E27FC236}">
+                <a16:creationId xmlns:a16="http://schemas.microsoft.com/office/drawing/2014/main" id="{E6B12153-B75C-26E6-5A38-FE3D1B60830A}"/>
+              </a:ext>
+            </a:extLst>
+          </p:cNvPr>
+          <p:cNvCxnSpPr>
+            <a:cxnSpLocks/>
+          </p:cNvCxnSpPr>
+          <p:nvPr/>
+        </p:nvCxnSpPr>
+        <p:spPr>
+          <a:xfrm rot="10800000" flipV="1">
+            <a:off x="6096000" y="2635764"/>
+            <a:ext cx="2088386" cy="2068438"/>
+          </a:xfrm>
+          <a:prstGeom prst="bentConnector3">
+            <a:avLst>
+              <a:gd name="adj1" fmla="val 100115"/>
+            </a:avLst>
+          </a:prstGeom>
+          <a:ln w="57150">
+            <a:solidFill>
+              <a:schemeClr val="tx1"/>
+            </a:solidFill>
+            <a:tailEnd type="triangle"/>
+          </a:ln>
+        </p:spPr>
+        <p:style>
+          <a:lnRef idx="1">
+            <a:schemeClr val="accent1"/>
+          </a:lnRef>
+          <a:fillRef idx="0">
+            <a:schemeClr val="accent1"/>
+          </a:fillRef>
+          <a:effectRef idx="0">
+            <a:schemeClr val="accent1"/>
+          </a:effectRef>
+          <a:fontRef idx="minor">
+            <a:schemeClr val="tx1"/>
+          </a:fontRef>
+        </p:style>
+      </p:cxnSp>
+      <p:sp>
+        <p:nvSpPr>
+          <p:cNvPr id="85" name="TextBox 84">
+            <a:extLst>
+              <a:ext uri="{FF2B5EF4-FFF2-40B4-BE49-F238E27FC236}">
+                <a16:creationId xmlns:a16="http://schemas.microsoft.com/office/drawing/2014/main" id="{EFE29793-CB23-F02B-F2F7-FD81E6ED62CD}"/>
+              </a:ext>
+            </a:extLst>
+          </p:cNvPr>
+          <p:cNvSpPr txBox="1"/>
+          <p:nvPr/>
+        </p:nvSpPr>
+        <p:spPr>
+          <a:xfrm>
+            <a:off x="474446" y="3630291"/>
+            <a:ext cx="2220693" cy="707886"/>
+          </a:xfrm>
+          <a:prstGeom prst="rect">
+            <a:avLst/>
+          </a:prstGeom>
+          <a:noFill/>
+        </p:spPr>
+        <p:txBody>
+          <a:bodyPr wrap="square" rtlCol="0">
+            <a:spAutoFit/>
+          </a:bodyPr>
+          <a:lstStyle/>
+          <a:p>
+            <a:pPr algn="ctr"/>
+            <a:r>
+              <a:rPr lang="en-US" sz="2000" b="1" dirty="0">
+                <a:solidFill>
+                  <a:srgbClr val="FF0000"/>
+                </a:solidFill>
+              </a:rPr>
+              <a:t>Nested multi-level structure</a:t>
+            </a:r>
+          </a:p>
+        </p:txBody>
+      </p:sp>
+      <p:cxnSp>
+        <p:nvCxnSpPr>
+          <p:cNvPr id="43" name="Elbow Connector 42">
+            <a:extLst>
+              <a:ext uri="{FF2B5EF4-FFF2-40B4-BE49-F238E27FC236}">
+                <a16:creationId xmlns:a16="http://schemas.microsoft.com/office/drawing/2014/main" id="{8983D938-437D-6D6F-D375-D55EF9C17ACB}"/>
+              </a:ext>
+            </a:extLst>
+          </p:cNvPr>
+          <p:cNvCxnSpPr>
+            <a:cxnSpLocks/>
+          </p:cNvCxnSpPr>
+          <p:nvPr/>
+        </p:nvCxnSpPr>
+        <p:spPr>
+          <a:xfrm>
+            <a:off x="2241953" y="1585456"/>
+            <a:ext cx="906372" cy="12700"/>
+          </a:xfrm>
+          <a:prstGeom prst="bentConnector3">
+            <a:avLst>
+              <a:gd name="adj1" fmla="val 88896"/>
+            </a:avLst>
+          </a:prstGeom>
+          <a:ln w="57150">
+            <a:solidFill>
+              <a:schemeClr val="tx1"/>
+            </a:solidFill>
+            <a:tailEnd type="triangle"/>
+          </a:ln>
+        </p:spPr>
+        <p:style>
+          <a:lnRef idx="1">
+            <a:schemeClr val="accent1"/>
+          </a:lnRef>
+          <a:fillRef idx="0">
+            <a:schemeClr val="accent1"/>
+          </a:fillRef>
+          <a:effectRef idx="0">
+            <a:schemeClr val="accent1"/>
+          </a:effectRef>
+          <a:fontRef idx="minor">
+            <a:schemeClr val="tx1"/>
+          </a:fontRef>
+        </p:style>
+      </p:cxnSp>
+      <p:sp>
+        <p:nvSpPr>
+          <p:cNvPr id="27" name="Curved Up Arrow 26">
+            <a:extLst>
+              <a:ext uri="{FF2B5EF4-FFF2-40B4-BE49-F238E27FC236}">
+                <a16:creationId xmlns:a16="http://schemas.microsoft.com/office/drawing/2014/main" id="{DEC6506A-97F2-5026-0E63-DAC0DEC9B013}"/>
+              </a:ext>
+            </a:extLst>
+          </p:cNvPr>
+          <p:cNvSpPr/>
+          <p:nvPr/>
+        </p:nvSpPr>
+        <p:spPr>
+          <a:xfrm rot="10800000">
+            <a:off x="2436020" y="1054694"/>
+            <a:ext cx="785378" cy="472408"/>
+          </a:xfrm>
+          <a:prstGeom prst="curvedUpArrow">
+            <a:avLst/>
+          </a:prstGeom>
+          <a:solidFill>
+            <a:schemeClr val="tx1"/>
+          </a:solidFill>
+          <a:ln>
+            <a:noFill/>
+          </a:ln>
+        </p:spPr>
+        <p:style>
+          <a:lnRef idx="2">
+            <a:schemeClr val="accent1">
+              <a:shade val="50000"/>
+            </a:schemeClr>
+          </a:lnRef>
+          <a:fillRef idx="1">
+            <a:schemeClr val="accent1"/>
+          </a:fillRef>
+          <a:effectRef idx="0">
+            <a:schemeClr val="accent1"/>
+          </a:effectRef>
+          <a:fontRef idx="minor">
+            <a:schemeClr val="lt1"/>
+          </a:fontRef>
+        </p:style>
+        <p:txBody>
+          <a:bodyPr rtlCol="0" anchor="ctr"/>
+          <a:lstStyle/>
+          <a:p>
+            <a:pPr algn="ctr"/>
+            <a:endParaRPr lang="en-US">
+              <a:solidFill>
+                <a:schemeClr val="tx1"/>
+              </a:solidFill>
+            </a:endParaRPr>
+          </a:p>
+        </p:txBody>
+      </p:sp>
+      <p:sp>
+        <p:nvSpPr>
+          <p:cNvPr id="58" name="TextBox 57">
+            <a:extLst>
+              <a:ext uri="{FF2B5EF4-FFF2-40B4-BE49-F238E27FC236}">
+                <a16:creationId xmlns:a16="http://schemas.microsoft.com/office/drawing/2014/main" id="{5246904F-DDA7-0D84-62F0-E115634C1E65}"/>
+              </a:ext>
+            </a:extLst>
+          </p:cNvPr>
+          <p:cNvSpPr txBox="1"/>
+          <p:nvPr/>
+        </p:nvSpPr>
+        <p:spPr>
+          <a:xfrm>
+            <a:off x="2241953" y="385934"/>
+            <a:ext cx="1167028" cy="646331"/>
+          </a:xfrm>
+          <a:prstGeom prst="rect">
+            <a:avLst/>
+          </a:prstGeom>
+          <a:noFill/>
+        </p:spPr>
+        <p:txBody>
+          <a:bodyPr wrap="square" rtlCol="0">
+            <a:spAutoFit/>
+          </a:bodyPr>
+          <a:lstStyle/>
+          <a:p>
+            <a:pPr algn="ctr"/>
+            <a:r>
+              <a:rPr lang="en-US" b="1" dirty="0"/>
+              <a:t>Scale analysis</a:t>
+            </a:r>
+          </a:p>
+        </p:txBody>
+      </p:sp>
+      <p:sp>
+        <p:nvSpPr>
+          <p:cNvPr id="60" name="TextBox 59">
+            <a:extLst>
+              <a:ext uri="{FF2B5EF4-FFF2-40B4-BE49-F238E27FC236}">
+                <a16:creationId xmlns:a16="http://schemas.microsoft.com/office/drawing/2014/main" id="{9D745148-9ABC-B30A-FD10-A6F30C1FC148}"/>
+              </a:ext>
+            </a:extLst>
+          </p:cNvPr>
+          <p:cNvSpPr txBox="1"/>
+          <p:nvPr/>
+        </p:nvSpPr>
+        <p:spPr>
+          <a:xfrm>
+            <a:off x="6384858" y="2693672"/>
+            <a:ext cx="1411705" cy="646331"/>
+          </a:xfrm>
+          <a:prstGeom prst="rect">
+            <a:avLst/>
+          </a:prstGeom>
+          <a:noFill/>
+        </p:spPr>
+        <p:txBody>
+          <a:bodyPr wrap="square" rtlCol="0">
+            <a:spAutoFit/>
+          </a:bodyPr>
+          <a:lstStyle/>
+          <a:p>
+            <a:pPr algn="ctr"/>
+            <a:r>
+              <a:rPr lang="en-US" b="1" dirty="0"/>
+              <a:t>Prior probability</a:t>
+            </a:r>
+          </a:p>
+        </p:txBody>
+      </p:sp>
+      <p:sp>
+        <p:nvSpPr>
+          <p:cNvPr id="72" name="TextBox 71">
+            <a:extLst>
+              <a:ext uri="{FF2B5EF4-FFF2-40B4-BE49-F238E27FC236}">
+                <a16:creationId xmlns:a16="http://schemas.microsoft.com/office/drawing/2014/main" id="{4AA89C78-7EF6-8EDE-2631-349CA5899A01}"/>
+              </a:ext>
+            </a:extLst>
+          </p:cNvPr>
+          <p:cNvSpPr txBox="1"/>
+          <p:nvPr/>
+        </p:nvSpPr>
+        <p:spPr>
+          <a:xfrm>
+            <a:off x="10089853" y="5406507"/>
+            <a:ext cx="1617097" cy="276999"/>
+          </a:xfrm>
+          <a:prstGeom prst="rect">
+            <a:avLst/>
+          </a:prstGeom>
+          <a:noFill/>
+        </p:spPr>
+        <p:txBody>
+          <a:bodyPr wrap="square" rtlCol="0">
+            <a:spAutoFit/>
+          </a:bodyPr>
+          <a:lstStyle/>
+          <a:p>
+            <a:pPr algn="ctr"/>
+            <a:r>
+              <a:rPr lang="en-US" sz="1200" dirty="0"/>
+              <a:t>Highly spatial biased</a:t>
+            </a:r>
+          </a:p>
+        </p:txBody>
+      </p:sp>
+    </p:spTree>
+    <p:extLst>
+      <p:ext uri="{BB962C8B-B14F-4D97-AF65-F5344CB8AC3E}">
+        <p14:creationId xmlns:p14="http://schemas.microsoft.com/office/powerpoint/2010/main" val="2786673536"/>
+      </p:ext>
+    </p:extLst>
+  </p:cSld>
+  <p:clrMapOvr>
+    <a:masterClrMapping/>
+  </p:clrMapOvr>
+</p:sld>
+</file>
+
+<file path=ppt/slides/slide6.xml><?xml version="1.0" encoding="utf-8"?>
+<p:sld xmlns:a="http://schemas.openxmlformats.org/drawingml/2006/main" xmlns:r="http://schemas.openxmlformats.org/officeDocument/2006/relationships" xmlns:p="http://schemas.openxmlformats.org/presentationml/2006/main">
+  <p:cSld>
+    <p:spTree>
+      <p:nvGrpSpPr>
+        <p:cNvPr id="1" name=""/>
+        <p:cNvGrpSpPr/>
+        <p:nvPr/>
+      </p:nvGrpSpPr>
+      <p:grpSpPr>
+        <a:xfrm>
+          <a:off x="0" y="0"/>
+          <a:ext cx="0" cy="0"/>
+          <a:chOff x="0" y="0"/>
+          <a:chExt cx="0" cy="0"/>
+        </a:xfrm>
+      </p:grpSpPr>
+    </p:spTree>
+    <p:extLst>
+      <p:ext uri="{BB962C8B-B14F-4D97-AF65-F5344CB8AC3E}">
+        <p14:creationId xmlns:p14="http://schemas.microsoft.com/office/powerpoint/2010/main" val="2142616210"/>
       </p:ext>
     </p:extLst>
   </p:cSld>
@@ -5304,4 +8685,299 @@
     </a:ext>
   </a:extLst>
 </a:theme>
+</file>
+
+<file path=ppt/theme/theme2.xml><?xml version="1.0" encoding="utf-8"?>
+<a:theme xmlns:a="http://schemas.openxmlformats.org/drawingml/2006/main" name="Office Theme">
+  <a:themeElements>
+    <a:clrScheme name="Office">
+      <a:dk1>
+        <a:sysClr val="windowText" lastClr="000000"/>
+      </a:dk1>
+      <a:lt1>
+        <a:sysClr val="window" lastClr="FFFFFF"/>
+      </a:lt1>
+      <a:dk2>
+        <a:srgbClr val="44546A"/>
+      </a:dk2>
+      <a:lt2>
+        <a:srgbClr val="E7E6E6"/>
+      </a:lt2>
+      <a:accent1>
+        <a:srgbClr val="4472C4"/>
+      </a:accent1>
+      <a:accent2>
+        <a:srgbClr val="ED7D31"/>
+      </a:accent2>
+      <a:accent3>
+        <a:srgbClr val="A5A5A5"/>
+      </a:accent3>
+      <a:accent4>
+        <a:srgbClr val="FFC000"/>
+      </a:accent4>
+      <a:accent5>
+        <a:srgbClr val="5B9BD5"/>
+      </a:accent5>
+      <a:accent6>
+        <a:srgbClr val="70AD47"/>
+      </a:accent6>
+      <a:hlink>
+        <a:srgbClr val="0563C1"/>
+      </a:hlink>
+      <a:folHlink>
+        <a:srgbClr val="954F72"/>
+      </a:folHlink>
+    </a:clrScheme>
+    <a:fontScheme name="Office">
+      <a:majorFont>
+        <a:latin typeface="Calibri Light" panose="020F0302020204030204"/>
+        <a:ea typeface=""/>
+        <a:cs typeface=""/>
+        <a:font script="Jpan" typeface="游ゴシック Light"/>
+        <a:font script="Hang" typeface="맑은 고딕"/>
+        <a:font script="Hans" typeface="等线 Light"/>
+        <a:font script="Hant" typeface="新細明體"/>
+        <a:font script="Arab" typeface="Times New Roman"/>
+        <a:font script="Hebr" typeface="Times New Roman"/>
+        <a:font script="Thai" typeface="Angsana New"/>
+        <a:font script="Ethi" typeface="Nyala"/>
+        <a:font script="Beng" typeface="Vrinda"/>
+        <a:font script="Gujr" typeface="Shruti"/>
+        <a:font script="Khmr" typeface="MoolBoran"/>
+        <a:font script="Knda" typeface="Tunga"/>
+        <a:font script="Guru" typeface="Raavi"/>
+        <a:font script="Cans" typeface="Euphemia"/>
+        <a:font script="Cher" typeface="Plantagenet Cherokee"/>
+        <a:font script="Yiii" typeface="Microsoft Yi Baiti"/>
+        <a:font script="Tibt" typeface="Microsoft Himalaya"/>
+        <a:font script="Thaa" typeface="MV Boli"/>
+        <a:font script="Deva" typeface="Mangal"/>
+        <a:font script="Telu" typeface="Gautami"/>
+        <a:font script="Taml" typeface="Latha"/>
+        <a:font script="Syrc" typeface="Estrangelo Edessa"/>
+        <a:font script="Orya" typeface="Kalinga"/>
+        <a:font script="Mlym" typeface="Kartika"/>
+        <a:font script="Laoo" typeface="DokChampa"/>
+        <a:font script="Sinh" typeface="Iskoola Pota"/>
+        <a:font script="Mong" typeface="Mongolian Baiti"/>
+        <a:font script="Viet" typeface="Times New Roman"/>
+        <a:font script="Uigh" typeface="Microsoft Uighur"/>
+        <a:font script="Geor" typeface="Sylfaen"/>
+        <a:font script="Armn" typeface="Arial"/>
+        <a:font script="Bugi" typeface="Leelawadee UI"/>
+        <a:font script="Bopo" typeface="Microsoft JhengHei"/>
+        <a:font script="Java" typeface="Javanese Text"/>
+        <a:font script="Lisu" typeface="Segoe UI"/>
+        <a:font script="Mymr" typeface="Myanmar Text"/>
+        <a:font script="Nkoo" typeface="Ebrima"/>
+        <a:font script="Olck" typeface="Nirmala UI"/>
+        <a:font script="Osma" typeface="Ebrima"/>
+        <a:font script="Phag" typeface="Phagspa"/>
+        <a:font script="Syrn" typeface="Estrangelo Edessa"/>
+        <a:font script="Syrj" typeface="Estrangelo Edessa"/>
+        <a:font script="Syre" typeface="Estrangelo Edessa"/>
+        <a:font script="Sora" typeface="Nirmala UI"/>
+        <a:font script="Tale" typeface="Microsoft Tai Le"/>
+        <a:font script="Talu" typeface="Microsoft New Tai Lue"/>
+        <a:font script="Tfng" typeface="Ebrima"/>
+      </a:majorFont>
+      <a:minorFont>
+        <a:latin typeface="Calibri" panose="020F0502020204030204"/>
+        <a:ea typeface=""/>
+        <a:cs typeface=""/>
+        <a:font script="Jpan" typeface="游ゴシック"/>
+        <a:font script="Hang" typeface="맑은 고딕"/>
+        <a:font script="Hans" typeface="等线"/>
+        <a:font script="Hant" typeface="新細明體"/>
+        <a:font script="Arab" typeface="Arial"/>
+        <a:font script="Hebr" typeface="Arial"/>
+        <a:font script="Thai" typeface="Cordia New"/>
+        <a:font script="Ethi" typeface="Nyala"/>
+        <a:font script="Beng" typeface="Vrinda"/>
+        <a:font script="Gujr" typeface="Shruti"/>
+        <a:font script="Khmr" typeface="DaunPenh"/>
+        <a:font script="Knda" typeface="Tunga"/>
+        <a:font script="Guru" typeface="Raavi"/>
+        <a:font script="Cans" typeface="Euphemia"/>
+        <a:font script="Cher" typeface="Plantagenet Cherokee"/>
+        <a:font script="Yiii" typeface="Microsoft Yi Baiti"/>
+        <a:font script="Tibt" typeface="Microsoft Himalaya"/>
+        <a:font script="Thaa" typeface="MV Boli"/>
+        <a:font script="Deva" typeface="Mangal"/>
+        <a:font script="Telu" typeface="Gautami"/>
+        <a:font script="Taml" typeface="Latha"/>
+        <a:font script="Syrc" typeface="Estrangelo Edessa"/>
+        <a:font script="Orya" typeface="Kalinga"/>
+        <a:font script="Mlym" typeface="Kartika"/>
+        <a:font script="Laoo" typeface="DokChampa"/>
+        <a:font script="Sinh" typeface="Iskoola Pota"/>
+        <a:font script="Mong" typeface="Mongolian Baiti"/>
+        <a:font script="Viet" typeface="Arial"/>
+        <a:font script="Uigh" typeface="Microsoft Uighur"/>
+        <a:font script="Geor" typeface="Sylfaen"/>
+        <a:font script="Armn" typeface="Arial"/>
+        <a:font script="Bugi" typeface="Leelawadee UI"/>
+        <a:font script="Bopo" typeface="Microsoft JhengHei"/>
+        <a:font script="Java" typeface="Javanese Text"/>
+        <a:font script="Lisu" typeface="Segoe UI"/>
+        <a:font script="Mymr" typeface="Myanmar Text"/>
+        <a:font script="Nkoo" typeface="Ebrima"/>
+        <a:font script="Olck" typeface="Nirmala UI"/>
+        <a:font script="Osma" typeface="Ebrima"/>
+        <a:font script="Phag" typeface="Phagspa"/>
+        <a:font script="Syrn" typeface="Estrangelo Edessa"/>
+        <a:font script="Syrj" typeface="Estrangelo Edessa"/>
+        <a:font script="Syre" typeface="Estrangelo Edessa"/>
+        <a:font script="Sora" typeface="Nirmala UI"/>
+        <a:font script="Tale" typeface="Microsoft Tai Le"/>
+        <a:font script="Talu" typeface="Microsoft New Tai Lue"/>
+        <a:font script="Tfng" typeface="Ebrima"/>
+      </a:minorFont>
+    </a:fontScheme>
+    <a:fmtScheme name="Office">
+      <a:fillStyleLst>
+        <a:solidFill>
+          <a:schemeClr val="phClr"/>
+        </a:solidFill>
+        <a:gradFill rotWithShape="1">
+          <a:gsLst>
+            <a:gs pos="0">
+              <a:schemeClr val="phClr">
+                <a:lumMod val="110000"/>
+                <a:satMod val="105000"/>
+                <a:tint val="67000"/>
+              </a:schemeClr>
+            </a:gs>
+            <a:gs pos="50000">
+              <a:schemeClr val="phClr">
+                <a:lumMod val="105000"/>
+                <a:satMod val="103000"/>
+                <a:tint val="73000"/>
+              </a:schemeClr>
+            </a:gs>
+            <a:gs pos="100000">
+              <a:schemeClr val="phClr">
+                <a:lumMod val="105000"/>
+                <a:satMod val="109000"/>
+                <a:tint val="81000"/>
+              </a:schemeClr>
+            </a:gs>
+          </a:gsLst>
+          <a:lin ang="5400000" scaled="0"/>
+        </a:gradFill>
+        <a:gradFill rotWithShape="1">
+          <a:gsLst>
+            <a:gs pos="0">
+              <a:schemeClr val="phClr">
+                <a:satMod val="103000"/>
+                <a:lumMod val="102000"/>
+                <a:tint val="94000"/>
+              </a:schemeClr>
+            </a:gs>
+            <a:gs pos="50000">
+              <a:schemeClr val="phClr">
+                <a:satMod val="110000"/>
+                <a:lumMod val="100000"/>
+                <a:shade val="100000"/>
+              </a:schemeClr>
+            </a:gs>
+            <a:gs pos="100000">
+              <a:schemeClr val="phClr">
+                <a:lumMod val="99000"/>
+                <a:satMod val="120000"/>
+                <a:shade val="78000"/>
+              </a:schemeClr>
+            </a:gs>
+          </a:gsLst>
+          <a:lin ang="5400000" scaled="0"/>
+        </a:gradFill>
+      </a:fillStyleLst>
+      <a:lnStyleLst>
+        <a:ln w="6350" cap="flat" cmpd="sng" algn="ctr">
+          <a:solidFill>
+            <a:schemeClr val="phClr"/>
+          </a:solidFill>
+          <a:prstDash val="solid"/>
+          <a:miter lim="800000"/>
+        </a:ln>
+        <a:ln w="12700" cap="flat" cmpd="sng" algn="ctr">
+          <a:solidFill>
+            <a:schemeClr val="phClr"/>
+          </a:solidFill>
+          <a:prstDash val="solid"/>
+          <a:miter lim="800000"/>
+        </a:ln>
+        <a:ln w="19050" cap="flat" cmpd="sng" algn="ctr">
+          <a:solidFill>
+            <a:schemeClr val="phClr"/>
+          </a:solidFill>
+          <a:prstDash val="solid"/>
+          <a:miter lim="800000"/>
+        </a:ln>
+      </a:lnStyleLst>
+      <a:effectStyleLst>
+        <a:effectStyle>
+          <a:effectLst/>
+        </a:effectStyle>
+        <a:effectStyle>
+          <a:effectLst/>
+        </a:effectStyle>
+        <a:effectStyle>
+          <a:effectLst>
+            <a:outerShdw blurRad="57150" dist="19050" dir="5400000" algn="ctr" rotWithShape="0">
+              <a:srgbClr val="000000">
+                <a:alpha val="63000"/>
+              </a:srgbClr>
+            </a:outerShdw>
+          </a:effectLst>
+        </a:effectStyle>
+      </a:effectStyleLst>
+      <a:bgFillStyleLst>
+        <a:solidFill>
+          <a:schemeClr val="phClr"/>
+        </a:solidFill>
+        <a:solidFill>
+          <a:schemeClr val="phClr">
+            <a:tint val="95000"/>
+            <a:satMod val="170000"/>
+          </a:schemeClr>
+        </a:solidFill>
+        <a:gradFill rotWithShape="1">
+          <a:gsLst>
+            <a:gs pos="0">
+              <a:schemeClr val="phClr">
+                <a:tint val="93000"/>
+                <a:satMod val="150000"/>
+                <a:shade val="98000"/>
+                <a:lumMod val="102000"/>
+              </a:schemeClr>
+            </a:gs>
+            <a:gs pos="50000">
+              <a:schemeClr val="phClr">
+                <a:tint val="98000"/>
+                <a:satMod val="130000"/>
+                <a:shade val="90000"/>
+                <a:lumMod val="103000"/>
+              </a:schemeClr>
+            </a:gs>
+            <a:gs pos="100000">
+              <a:schemeClr val="phClr">
+                <a:shade val="63000"/>
+                <a:satMod val="120000"/>
+              </a:schemeClr>
+            </a:gs>
+          </a:gsLst>
+          <a:lin ang="5400000" scaled="0"/>
+        </a:gradFill>
+      </a:bgFillStyleLst>
+    </a:fmtScheme>
+  </a:themeElements>
+  <a:objectDefaults/>
+  <a:extraClrSchemeLst/>
+  <a:extLst>
+    <a:ext uri="{05A4C25C-085E-4340-85A3-A5531E510DB2}">
+      <thm15:themeFamily xmlns:thm15="http://schemas.microsoft.com/office/thememl/2012/main" name="Office Theme" id="{62F939B6-93AF-4DB8-9C6B-D6C7DFDC589F}" vid="{4A3C46E8-61CC-4603-A589-7422A47A8E4A}"/>
+    </a:ext>
+  </a:extLst>
+</a:theme>
 </file>
</xml_diff>